<commit_message>
Replace font to 'Dengxian'
The default font in Microsoft Office 2016 Chinese Edition for Windows
</commit_message>
<xml_diff>
--- a/Web Front End Stack.pptx
+++ b/Web Front End Stack.pptx
@@ -2532,7 +2532,7 @@
         <p:nvSpPr>
           <p:cNvPr id="1026" name="Rectangle 2"/>
           <p:cNvSpPr>
-            <a:spLocks noChangeArrowheads="1"/>
+            <a:spLocks noGrp="1" noChangeArrowheads="1"/>
           </p:cNvSpPr>
           <p:nvPr>
             <p:ph type="title"/>
@@ -2600,7 +2600,7 @@
         <p:nvSpPr>
           <p:cNvPr id="1027" name="Rectangle 3"/>
           <p:cNvSpPr>
-            <a:spLocks noChangeArrowheads="1"/>
+            <a:spLocks noGrp="1" noChangeArrowheads="1"/>
           </p:cNvSpPr>
           <p:nvPr>
             <p:ph type="body" idx="1"/>
@@ -2696,7 +2696,7 @@
         <p:nvSpPr>
           <p:cNvPr id="1028" name="Rectangle 4"/>
           <p:cNvSpPr>
-            <a:spLocks noChangeArrowheads="1"/>
+            <a:spLocks noGrp="1" noChangeArrowheads="1"/>
           </p:cNvSpPr>
           <p:nvPr>
             <p:ph type="dt" sz="half" idx="2"/>
@@ -2764,7 +2764,7 @@
         <p:nvSpPr>
           <p:cNvPr id="1029" name="Rectangle 5"/>
           <p:cNvSpPr>
-            <a:spLocks noChangeArrowheads="1"/>
+            <a:spLocks noGrp="1" noChangeArrowheads="1"/>
           </p:cNvSpPr>
           <p:nvPr>
             <p:ph type="ftr" sz="quarter" idx="3"/>
@@ -2832,7 +2832,7 @@
         <p:nvSpPr>
           <p:cNvPr id="1030" name="Rectangle 6"/>
           <p:cNvSpPr>
-            <a:spLocks noChangeArrowheads="1"/>
+            <a:spLocks noGrp="1" noChangeArrowheads="1"/>
           </p:cNvSpPr>
           <p:nvPr>
             <p:ph type="sldNum" sz="quarter" idx="4"/>
@@ -3388,8 +3388,9 @@
                 <a:solidFill>
                   <a:schemeClr val="bg1"/>
                 </a:solidFill>
-                <a:latin typeface="Consolas" panose="020B0609020204030204" pitchFamily="49" charset="0"/>
-                <a:ea typeface="宋体" panose="02010600030101010101" pitchFamily="2" charset="-122"/>
+                <a:latin typeface="等线" panose="02010600030101010101" pitchFamily="2" charset="-122"/>
+                <a:ea typeface="等线" panose="02010600030101010101" pitchFamily="2" charset="-122"/>
+                <a:cs typeface="Courier New" panose="02070309020205020404" pitchFamily="49" charset="0"/>
               </a:rPr>
               <a:t>Operation System</a:t>
             </a:r>
@@ -3453,7 +3454,9 @@
           <a:lstStyle/>
           <a:p>
             <a:endParaRPr lang="en-US" altLang="en-US" sz="800">
-              <a:latin typeface="Consolas" panose="020B0609020204030204" pitchFamily="49" charset="0"/>
+              <a:latin typeface="等线" panose="02010600030101010101" pitchFamily="2" charset="-122"/>
+              <a:ea typeface="等线" panose="02010600030101010101" pitchFamily="2" charset="-122"/>
+              <a:cs typeface="Courier New" panose="02070309020205020404" pitchFamily="49" charset="0"/>
             </a:endParaRPr>
           </a:p>
         </p:txBody>
@@ -3469,7 +3472,7 @@
         <p:spPr bwMode="auto">
           <a:xfrm>
             <a:off x="266700" y="6600825"/>
-            <a:ext cx="1381125" cy="212725"/>
+            <a:ext cx="1381125" cy="215444"/>
           </a:xfrm>
           <a:prstGeom prst="rect">
             <a:avLst/>
@@ -3517,8 +3520,9 @@
             <a:pPr algn="r"/>
             <a:r>
               <a:rPr lang="zh-CN" altLang="en-US" sz="800">
-                <a:latin typeface="Consolas" panose="020B0609020204030204" pitchFamily="49" charset="0"/>
-                <a:ea typeface="宋体" panose="02010600030101010101" pitchFamily="2" charset="-122"/>
+                <a:latin typeface="等线" panose="02010600030101010101" pitchFamily="2" charset="-122"/>
+                <a:ea typeface="等线" panose="02010600030101010101" pitchFamily="2" charset="-122"/>
+                <a:cs typeface="Courier New" panose="02070309020205020404" pitchFamily="49" charset="0"/>
               </a:rPr>
               <a:t>unruledboy@gmail.com</a:t>
             </a:r>
@@ -3536,7 +3540,7 @@
         <p:spPr bwMode="auto">
           <a:xfrm>
             <a:off x="6965950" y="6600825"/>
-            <a:ext cx="2133600" cy="212725"/>
+            <a:ext cx="2133600" cy="215444"/>
           </a:xfrm>
           <a:prstGeom prst="rect">
             <a:avLst/>
@@ -3583,22 +3587,25 @@
           <a:p>
             <a:r>
               <a:rPr lang="zh-CN" altLang="en-US" sz="800">
-                <a:latin typeface="Consolas" panose="020B0609020204030204" pitchFamily="49" charset="0"/>
-                <a:ea typeface="宋体" panose="02010600030101010101" pitchFamily="2" charset="-122"/>
+                <a:latin typeface="等线" panose="02010600030101010101" pitchFamily="2" charset="-122"/>
+                <a:ea typeface="等线" panose="02010600030101010101" pitchFamily="2" charset="-122"/>
+                <a:cs typeface="Courier New" panose="02070309020205020404" pitchFamily="49" charset="0"/>
               </a:rPr>
               <a:t>by Wilson Chen (</a:t>
             </a:r>
             <a:r>
               <a:rPr lang="en-AU" altLang="en-US" sz="800">
-                <a:latin typeface="Consolas" panose="020B0609020204030204" pitchFamily="49" charset="0"/>
-                <a:ea typeface="宋体" panose="02010600030101010101" pitchFamily="2" charset="-122"/>
+                <a:latin typeface="等线" panose="02010600030101010101" pitchFamily="2" charset="-122"/>
+                <a:ea typeface="等线" panose="02010600030101010101" pitchFamily="2" charset="-122"/>
+                <a:cs typeface="Courier New" panose="02070309020205020404" pitchFamily="49" charset="0"/>
               </a:rPr>
               <a:t>twitter</a:t>
             </a:r>
             <a:r>
               <a:rPr lang="zh-CN" altLang="en-US" sz="800">
-                <a:latin typeface="Consolas" panose="020B0609020204030204" pitchFamily="49" charset="0"/>
-                <a:ea typeface="宋体" panose="02010600030101010101" pitchFamily="2" charset="-122"/>
+                <a:latin typeface="等线" panose="02010600030101010101" pitchFamily="2" charset="-122"/>
+                <a:ea typeface="等线" panose="02010600030101010101" pitchFamily="2" charset="-122"/>
+                <a:cs typeface="Courier New" panose="02070309020205020404" pitchFamily="49" charset="0"/>
               </a:rPr>
               <a:t>@unruledboy)</a:t>
             </a:r>
@@ -3668,8 +3675,9 @@
                 <a:solidFill>
                   <a:schemeClr val="bg1"/>
                 </a:solidFill>
-                <a:latin typeface="Consolas" panose="020B0609020204030204" pitchFamily="49" charset="0"/>
-                <a:ea typeface="宋体" panose="02010600030101010101" pitchFamily="2" charset="-122"/>
+                <a:latin typeface="等线" panose="02010600030101010101" pitchFamily="2" charset="-122"/>
+                <a:ea typeface="等线" panose="02010600030101010101" pitchFamily="2" charset="-122"/>
+                <a:cs typeface="Courier New" panose="02070309020205020404" pitchFamily="49" charset="0"/>
               </a:rPr>
               <a:t>Rendering</a:t>
             </a:r>
@@ -3681,8 +3689,9 @@
                 <a:solidFill>
                   <a:schemeClr val="bg1"/>
                 </a:solidFill>
-                <a:latin typeface="Consolas" panose="020B0609020204030204" pitchFamily="49" charset="0"/>
-                <a:ea typeface="宋体" panose="02010600030101010101" pitchFamily="2" charset="-122"/>
+                <a:latin typeface="等线" panose="02010600030101010101" pitchFamily="2" charset="-122"/>
+                <a:ea typeface="等线" panose="02010600030101010101" pitchFamily="2" charset="-122"/>
+                <a:cs typeface="Courier New" panose="02070309020205020404" pitchFamily="49" charset="0"/>
               </a:rPr>
               <a:t>Engine</a:t>
             </a:r>
@@ -3691,8 +3700,9 @@
                 <a:solidFill>
                   <a:schemeClr val="bg1"/>
                 </a:solidFill>
-                <a:latin typeface="Consolas" panose="020B0609020204030204" pitchFamily="49" charset="0"/>
-                <a:ea typeface="宋体" panose="02010600030101010101" pitchFamily="2" charset="-122"/>
+                <a:latin typeface="等线" panose="02010600030101010101" pitchFamily="2" charset="-122"/>
+                <a:ea typeface="等线" panose="02010600030101010101" pitchFamily="2" charset="-122"/>
+                <a:cs typeface="Courier New" panose="02070309020205020404" pitchFamily="49" charset="0"/>
               </a:rPr>
               <a:t>s</a:t>
             </a:r>
@@ -3700,8 +3710,9 @@
               <a:solidFill>
                 <a:schemeClr val="bg1"/>
               </a:solidFill>
-              <a:latin typeface="Consolas" panose="020B0609020204030204" pitchFamily="49" charset="0"/>
-              <a:ea typeface="宋体" panose="02010600030101010101" pitchFamily="2" charset="-122"/>
+              <a:latin typeface="等线" panose="02010600030101010101" pitchFamily="2" charset="-122"/>
+              <a:ea typeface="等线" panose="02010600030101010101" pitchFamily="2" charset="-122"/>
+              <a:cs typeface="Courier New" panose="02070309020205020404" pitchFamily="49" charset="0"/>
             </a:endParaRPr>
           </a:p>
         </p:txBody>
@@ -3763,8 +3774,9 @@
                 <a:solidFill>
                   <a:schemeClr val="bg1"/>
                 </a:solidFill>
-                <a:latin typeface="Consolas" panose="020B0609020204030204" pitchFamily="49" charset="0"/>
-                <a:ea typeface="宋体" panose="02010600030101010101" pitchFamily="2" charset="-122"/>
+                <a:latin typeface="等线" panose="02010600030101010101" pitchFamily="2" charset="-122"/>
+                <a:ea typeface="等线" panose="02010600030101010101" pitchFamily="2" charset="-122"/>
+                <a:cs typeface="Courier New" panose="02070309020205020404" pitchFamily="49" charset="0"/>
               </a:rPr>
               <a:t>Triddent</a:t>
             </a:r>
@@ -3776,8 +3788,9 @@
                 <a:solidFill>
                   <a:schemeClr val="bg1"/>
                 </a:solidFill>
-                <a:latin typeface="Consolas" panose="020B0609020204030204" pitchFamily="49" charset="0"/>
-                <a:ea typeface="宋体" panose="02010600030101010101" pitchFamily="2" charset="-122"/>
+                <a:latin typeface="等线" panose="02010600030101010101" pitchFamily="2" charset="-122"/>
+                <a:ea typeface="等线" panose="02010600030101010101" pitchFamily="2" charset="-122"/>
+                <a:cs typeface="Courier New" panose="02070309020205020404" pitchFamily="49" charset="0"/>
               </a:rPr>
               <a:t>(IE)</a:t>
             </a:r>
@@ -3841,8 +3854,9 @@
                 <a:solidFill>
                   <a:schemeClr val="bg1"/>
                 </a:solidFill>
-                <a:latin typeface="Consolas" panose="020B0609020204030204" pitchFamily="49" charset="0"/>
-                <a:ea typeface="宋体" panose="02010600030101010101" pitchFamily="2" charset="-122"/>
+                <a:latin typeface="等线" panose="02010600030101010101" pitchFamily="2" charset="-122"/>
+                <a:ea typeface="等线" panose="02010600030101010101" pitchFamily="2" charset="-122"/>
+                <a:cs typeface="Courier New" panose="02070309020205020404" pitchFamily="49" charset="0"/>
               </a:rPr>
               <a:t>Blink</a:t>
             </a:r>
@@ -3851,7 +3865,9 @@
                 <a:solidFill>
                   <a:schemeClr val="bg1"/>
                 </a:solidFill>
-                <a:latin typeface="Consolas" panose="020B0609020204030204" pitchFamily="49" charset="0"/>
+                <a:latin typeface="等线" panose="02010600030101010101" pitchFamily="2" charset="-122"/>
+                <a:ea typeface="等线" panose="02010600030101010101" pitchFamily="2" charset="-122"/>
+                <a:cs typeface="Courier New" panose="02070309020205020404" pitchFamily="49" charset="0"/>
               </a:rPr>
               <a:t> </a:t>
             </a:r>
@@ -3860,8 +3876,9 @@
                 <a:solidFill>
                   <a:schemeClr val="bg1"/>
                 </a:solidFill>
-                <a:latin typeface="Consolas" panose="020B0609020204030204" pitchFamily="49" charset="0"/>
-                <a:ea typeface="宋体" panose="02010600030101010101" pitchFamily="2" charset="-122"/>
+                <a:latin typeface="等线" panose="02010600030101010101" pitchFamily="2" charset="-122"/>
+                <a:ea typeface="等线" panose="02010600030101010101" pitchFamily="2" charset="-122"/>
+                <a:cs typeface="Courier New" panose="02070309020205020404" pitchFamily="49" charset="0"/>
               </a:rPr>
               <a:t>[prev. WebKit]</a:t>
             </a:r>
@@ -3873,8 +3890,9 @@
                 <a:solidFill>
                   <a:schemeClr val="bg1"/>
                 </a:solidFill>
-                <a:latin typeface="Consolas" panose="020B0609020204030204" pitchFamily="49" charset="0"/>
-                <a:ea typeface="宋体" panose="02010600030101010101" pitchFamily="2" charset="-122"/>
+                <a:latin typeface="等线" panose="02010600030101010101" pitchFamily="2" charset="-122"/>
+                <a:ea typeface="等线" panose="02010600030101010101" pitchFamily="2" charset="-122"/>
+                <a:cs typeface="Courier New" panose="02070309020205020404" pitchFamily="49" charset="0"/>
               </a:rPr>
               <a:t> (Chrome)</a:t>
             </a:r>
@@ -3938,8 +3956,9 @@
                 <a:solidFill>
                   <a:schemeClr val="bg1"/>
                 </a:solidFill>
-                <a:latin typeface="Consolas" panose="020B0609020204030204" pitchFamily="49" charset="0"/>
-                <a:ea typeface="宋体" panose="02010600030101010101" pitchFamily="2" charset="-122"/>
+                <a:latin typeface="等线" panose="02010600030101010101" pitchFamily="2" charset="-122"/>
+                <a:ea typeface="等线" panose="02010600030101010101" pitchFamily="2" charset="-122"/>
+                <a:cs typeface="Courier New" panose="02070309020205020404" pitchFamily="49" charset="0"/>
               </a:rPr>
               <a:t>WebKit</a:t>
             </a:r>
@@ -3951,8 +3970,9 @@
                 <a:solidFill>
                   <a:schemeClr val="bg1"/>
                 </a:solidFill>
-                <a:latin typeface="Consolas" panose="020B0609020204030204" pitchFamily="49" charset="0"/>
-                <a:ea typeface="宋体" panose="02010600030101010101" pitchFamily="2" charset="-122"/>
+                <a:latin typeface="等线" panose="02010600030101010101" pitchFamily="2" charset="-122"/>
+                <a:ea typeface="等线" panose="02010600030101010101" pitchFamily="2" charset="-122"/>
+                <a:cs typeface="Courier New" panose="02070309020205020404" pitchFamily="49" charset="0"/>
               </a:rPr>
               <a:t>(Safari)</a:t>
             </a:r>
@@ -4016,8 +4036,9 @@
                 <a:solidFill>
                   <a:schemeClr val="bg1"/>
                 </a:solidFill>
-                <a:latin typeface="Consolas" panose="020B0609020204030204" pitchFamily="49" charset="0"/>
-                <a:ea typeface="宋体" panose="02010600030101010101" pitchFamily="2" charset="-122"/>
+                <a:latin typeface="等线" panose="02010600030101010101" pitchFamily="2" charset="-122"/>
+                <a:ea typeface="等线" panose="02010600030101010101" pitchFamily="2" charset="-122"/>
+                <a:cs typeface="Courier New" panose="02070309020205020404" pitchFamily="49" charset="0"/>
               </a:rPr>
               <a:t>Blink [prev. Presto] </a:t>
             </a:r>
@@ -4029,8 +4050,9 @@
                 <a:solidFill>
                   <a:schemeClr val="bg1"/>
                 </a:solidFill>
-                <a:latin typeface="Consolas" panose="020B0609020204030204" pitchFamily="49" charset="0"/>
-                <a:ea typeface="宋体" panose="02010600030101010101" pitchFamily="2" charset="-122"/>
+                <a:latin typeface="等线" panose="02010600030101010101" pitchFamily="2" charset="-122"/>
+                <a:ea typeface="等线" panose="02010600030101010101" pitchFamily="2" charset="-122"/>
+                <a:cs typeface="Courier New" panose="02070309020205020404" pitchFamily="49" charset="0"/>
               </a:rPr>
               <a:t>(Opera)</a:t>
             </a:r>
@@ -4100,8 +4122,9 @@
                 <a:solidFill>
                   <a:schemeClr val="bg1"/>
                 </a:solidFill>
-                <a:latin typeface="Consolas" panose="020B0609020204030204" pitchFamily="49" charset="0"/>
-                <a:ea typeface="宋体" panose="02010600030101010101" pitchFamily="2" charset="-122"/>
+                <a:latin typeface="等线" panose="02010600030101010101" pitchFamily="2" charset="-122"/>
+                <a:ea typeface="等线" panose="02010600030101010101" pitchFamily="2" charset="-122"/>
+                <a:cs typeface="Courier New" panose="02070309020205020404" pitchFamily="49" charset="0"/>
               </a:rPr>
               <a:t>The 3 Pillars</a:t>
             </a:r>
@@ -4165,8 +4188,9 @@
                 <a:solidFill>
                   <a:schemeClr val="bg1"/>
                 </a:solidFill>
-                <a:latin typeface="Consolas" panose="020B0609020204030204" pitchFamily="49" charset="0"/>
-                <a:ea typeface="宋体" panose="02010600030101010101" pitchFamily="2" charset="-122"/>
+                <a:latin typeface="等线" panose="02010600030101010101" pitchFamily="2" charset="-122"/>
+                <a:ea typeface="等线" panose="02010600030101010101" pitchFamily="2" charset="-122"/>
+                <a:cs typeface="Courier New" panose="02070309020205020404" pitchFamily="49" charset="0"/>
               </a:rPr>
               <a:t>HTML (HyperText Markup Language)</a:t>
             </a:r>
@@ -4230,12 +4254,17 @@
                 <a:solidFill>
                   <a:schemeClr val="bg1"/>
                 </a:solidFill>
-                <a:latin typeface="Consolas" panose="020B0609020204030204" pitchFamily="49" charset="0"/>
-                <a:ea typeface="宋体" panose="02010600030101010101" pitchFamily="2" charset="-122"/>
+                <a:latin typeface="等线" panose="02010600030101010101" pitchFamily="2" charset="-122"/>
+                <a:ea typeface="等线" panose="02010600030101010101" pitchFamily="2" charset="-122"/>
+                <a:cs typeface="Courier New" panose="02070309020205020404" pitchFamily="49" charset="0"/>
               </a:rPr>
               <a:t>JavaScript</a:t>
             </a:r>
-            <a:endParaRPr lang="en-AU" altLang="en-US" sz="800"/>
+            <a:endParaRPr lang="en-AU" altLang="en-US" sz="800">
+              <a:latin typeface="等线" panose="02010600030101010101" pitchFamily="2" charset="-122"/>
+              <a:ea typeface="等线" panose="02010600030101010101" pitchFamily="2" charset="-122"/>
+              <a:cs typeface="Courier New" panose="02070309020205020404" pitchFamily="49" charset="0"/>
+            </a:endParaRPr>
           </a:p>
         </p:txBody>
       </p:sp>
@@ -4296,8 +4325,9 @@
                 <a:solidFill>
                   <a:schemeClr val="bg1"/>
                 </a:solidFill>
-                <a:latin typeface="Consolas" panose="020B0609020204030204" pitchFamily="49" charset="0"/>
-                <a:ea typeface="宋体" panose="02010600030101010101" pitchFamily="2" charset="-122"/>
+                <a:latin typeface="等线" panose="02010600030101010101" pitchFamily="2" charset="-122"/>
+                <a:ea typeface="等线" panose="02010600030101010101" pitchFamily="2" charset="-122"/>
+                <a:cs typeface="Courier New" panose="02070309020205020404" pitchFamily="49" charset="0"/>
               </a:rPr>
               <a:t>CSS (Cascading Style Sheets)</a:t>
             </a:r>
@@ -4367,8 +4397,9 @@
                 <a:solidFill>
                   <a:schemeClr val="bg1"/>
                 </a:solidFill>
-                <a:latin typeface="Consolas" panose="020B0609020204030204" pitchFamily="49" charset="0"/>
-                <a:ea typeface="宋体" panose="02010600030101010101" pitchFamily="2" charset="-122"/>
+                <a:latin typeface="等线" panose="02010600030101010101" pitchFamily="2" charset="-122"/>
+                <a:ea typeface="等线" panose="02010600030101010101" pitchFamily="2" charset="-122"/>
+                <a:cs typeface="Courier New" panose="02070309020205020404" pitchFamily="49" charset="0"/>
               </a:rPr>
               <a:t>Core Concepts</a:t>
             </a:r>
@@ -4432,8 +4463,9 @@
                 <a:solidFill>
                   <a:schemeClr val="bg1"/>
                 </a:solidFill>
-                <a:latin typeface="Consolas" panose="020B0609020204030204" pitchFamily="49" charset="0"/>
-                <a:ea typeface="宋体" panose="02010600030101010101" pitchFamily="2" charset="-122"/>
+                <a:latin typeface="等线" panose="02010600030101010101" pitchFamily="2" charset="-122"/>
+                <a:ea typeface="等线" panose="02010600030101010101" pitchFamily="2" charset="-122"/>
+                <a:cs typeface="Courier New" panose="02070309020205020404" pitchFamily="49" charset="0"/>
               </a:rPr>
               <a:t>Selector, Priority, Specificity, Box Model</a:t>
             </a:r>
@@ -4445,8 +4477,9 @@
                 <a:solidFill>
                   <a:schemeClr val="bg1"/>
                 </a:solidFill>
-                <a:latin typeface="Consolas" panose="020B0609020204030204" pitchFamily="49" charset="0"/>
-                <a:ea typeface="宋体" panose="02010600030101010101" pitchFamily="2" charset="-122"/>
+                <a:latin typeface="等线" panose="02010600030101010101" pitchFamily="2" charset="-122"/>
+                <a:ea typeface="等线" panose="02010600030101010101" pitchFamily="2" charset="-122"/>
+                <a:cs typeface="Courier New" panose="02070309020205020404" pitchFamily="49" charset="0"/>
               </a:rPr>
               <a:t>(CSS)</a:t>
             </a:r>
@@ -4454,8 +4487,9 @@
               <a:solidFill>
                 <a:schemeClr val="bg1"/>
               </a:solidFill>
-              <a:latin typeface="Consolas" panose="020B0609020204030204" pitchFamily="49" charset="0"/>
-              <a:ea typeface="宋体" panose="02010600030101010101" pitchFamily="2" charset="-122"/>
+              <a:latin typeface="等线" panose="02010600030101010101" pitchFamily="2" charset="-122"/>
+              <a:ea typeface="等线" panose="02010600030101010101" pitchFamily="2" charset="-122"/>
+              <a:cs typeface="Courier New" panose="02070309020205020404" pitchFamily="49" charset="0"/>
             </a:endParaRPr>
           </a:p>
         </p:txBody>
@@ -4523,8 +4557,9 @@
                 <a:solidFill>
                   <a:schemeClr val="bg1"/>
                 </a:solidFill>
-                <a:latin typeface="Consolas" panose="020B0609020204030204" pitchFamily="49" charset="0"/>
-                <a:ea typeface="宋体" panose="02010600030101010101" pitchFamily="2" charset="-122"/>
+                <a:latin typeface="等线" panose="02010600030101010101" pitchFamily="2" charset="-122"/>
+                <a:ea typeface="等线" panose="02010600030101010101" pitchFamily="2" charset="-122"/>
+                <a:cs typeface="Courier New" panose="02070309020205020404" pitchFamily="49" charset="0"/>
               </a:rPr>
               <a:t>Build Tasks</a:t>
             </a:r>
@@ -4588,8 +4623,9 @@
                 <a:solidFill>
                   <a:schemeClr val="bg1"/>
                 </a:solidFill>
-                <a:latin typeface="Consolas" panose="020B0609020204030204" pitchFamily="49" charset="0"/>
-                <a:ea typeface="宋体" panose="02010600030101010101" pitchFamily="2" charset="-122"/>
+                <a:latin typeface="等线" panose="02010600030101010101" pitchFamily="2" charset="-122"/>
+                <a:ea typeface="等线" panose="02010600030101010101" pitchFamily="2" charset="-122"/>
+                <a:cs typeface="Courier New" panose="02070309020205020404" pitchFamily="49" charset="0"/>
               </a:rPr>
               <a:t>Compilation</a:t>
             </a:r>
@@ -4653,8 +4689,9 @@
                 <a:solidFill>
                   <a:schemeClr val="bg1"/>
                 </a:solidFill>
-                <a:latin typeface="Consolas" panose="020B0609020204030204" pitchFamily="49" charset="0"/>
-                <a:ea typeface="宋体" panose="02010600030101010101" pitchFamily="2" charset="-122"/>
+                <a:latin typeface="等线" panose="02010600030101010101" pitchFamily="2" charset="-122"/>
+                <a:ea typeface="等线" panose="02010600030101010101" pitchFamily="2" charset="-122"/>
+                <a:cs typeface="Courier New" panose="02070309020205020404" pitchFamily="49" charset="0"/>
               </a:rPr>
               <a:t>Minification</a:t>
             </a:r>
@@ -4718,8 +4755,9 @@
                 <a:solidFill>
                   <a:schemeClr val="bg1"/>
                 </a:solidFill>
-                <a:latin typeface="Consolas" panose="020B0609020204030204" pitchFamily="49" charset="0"/>
-                <a:ea typeface="宋体" panose="02010600030101010101" pitchFamily="2" charset="-122"/>
+                <a:latin typeface="等线" panose="02010600030101010101" pitchFamily="2" charset="-122"/>
+                <a:ea typeface="等线" panose="02010600030101010101" pitchFamily="2" charset="-122"/>
+                <a:cs typeface="Courier New" panose="02070309020205020404" pitchFamily="49" charset="0"/>
               </a:rPr>
               <a:t>Concatenation</a:t>
             </a:r>
@@ -4783,8 +4821,9 @@
                 <a:solidFill>
                   <a:schemeClr val="bg1"/>
                 </a:solidFill>
-                <a:latin typeface="Consolas" panose="020B0609020204030204" pitchFamily="49" charset="0"/>
-                <a:ea typeface="宋体" panose="02010600030101010101" pitchFamily="2" charset="-122"/>
+                <a:latin typeface="等线" panose="02010600030101010101" pitchFamily="2" charset="-122"/>
+                <a:ea typeface="等线" panose="02010600030101010101" pitchFamily="2" charset="-122"/>
+                <a:cs typeface="Courier New" panose="02070309020205020404" pitchFamily="49" charset="0"/>
               </a:rPr>
               <a:t>Uglification</a:t>
             </a:r>
@@ -4854,8 +4893,9 @@
                 <a:solidFill>
                   <a:schemeClr val="bg1"/>
                 </a:solidFill>
-                <a:latin typeface="Consolas" panose="020B0609020204030204" pitchFamily="49" charset="0"/>
-                <a:ea typeface="宋体" panose="02010600030101010101" pitchFamily="2" charset="-122"/>
+                <a:latin typeface="等线" panose="02010600030101010101" pitchFamily="2" charset="-122"/>
+                <a:ea typeface="等线" panose="02010600030101010101" pitchFamily="2" charset="-122"/>
+                <a:cs typeface="Courier New" panose="02070309020205020404" pitchFamily="49" charset="0"/>
               </a:rPr>
               <a:t>Package</a:t>
             </a:r>
@@ -4919,8 +4959,9 @@
                 <a:solidFill>
                   <a:schemeClr val="bg1"/>
                 </a:solidFill>
-                <a:latin typeface="Consolas" panose="020B0609020204030204" pitchFamily="49" charset="0"/>
-                <a:ea typeface="宋体" panose="02010600030101010101" pitchFamily="2" charset="-122"/>
+                <a:latin typeface="等线" panose="02010600030101010101" pitchFamily="2" charset="-122"/>
+                <a:ea typeface="等线" panose="02010600030101010101" pitchFamily="2" charset="-122"/>
+                <a:cs typeface="Courier New" panose="02070309020205020404" pitchFamily="49" charset="0"/>
               </a:rPr>
               <a:t>NPM</a:t>
             </a:r>
@@ -4984,8 +5025,9 @@
                 <a:solidFill>
                   <a:schemeClr val="bg1"/>
                 </a:solidFill>
-                <a:latin typeface="Consolas" panose="020B0609020204030204" pitchFamily="49" charset="0"/>
-                <a:ea typeface="宋体" panose="02010600030101010101" pitchFamily="2" charset="-122"/>
+                <a:latin typeface="等线" panose="02010600030101010101" pitchFamily="2" charset="-122"/>
+                <a:ea typeface="等线" panose="02010600030101010101" pitchFamily="2" charset="-122"/>
+                <a:cs typeface="Courier New" panose="02070309020205020404" pitchFamily="49" charset="0"/>
               </a:rPr>
               <a:t>Bower </a:t>
             </a:r>
@@ -5003,7 +5045,7 @@
         <p:spPr bwMode="auto">
           <a:xfrm>
             <a:off x="758825" y="3175"/>
-            <a:ext cx="5491163" cy="244475"/>
+            <a:ext cx="4281941" cy="246221"/>
           </a:xfrm>
           <a:prstGeom prst="rect">
             <a:avLst/>
@@ -5050,43 +5092,49 @@
           <a:p>
             <a:r>
               <a:rPr lang="en-AU" altLang="en-US" sz="1000">
-                <a:latin typeface="Consolas" panose="020B0609020204030204" pitchFamily="49" charset="0"/>
-                <a:ea typeface="宋体" panose="02010600030101010101" pitchFamily="2" charset="-122"/>
+                <a:latin typeface="等线" panose="02010600030101010101" pitchFamily="2" charset="-122"/>
+                <a:ea typeface="等线" panose="02010600030101010101" pitchFamily="2" charset="-122"/>
+                <a:cs typeface="Courier New" panose="02070309020205020404" pitchFamily="49" charset="0"/>
               </a:rPr>
               <a:t>Web Front End</a:t>
             </a:r>
             <a:r>
               <a:rPr lang="zh-CN" altLang="en-US" sz="1000">
-                <a:latin typeface="Consolas" panose="020B0609020204030204" pitchFamily="49" charset="0"/>
-                <a:ea typeface="宋体" panose="02010600030101010101" pitchFamily="2" charset="-122"/>
+                <a:latin typeface="等线" panose="02010600030101010101" pitchFamily="2" charset="-122"/>
+                <a:ea typeface="等线" panose="02010600030101010101" pitchFamily="2" charset="-122"/>
+                <a:cs typeface="Courier New" panose="02070309020205020404" pitchFamily="49" charset="0"/>
               </a:rPr>
               <a:t> Stack (</a:t>
             </a:r>
             <a:r>
               <a:rPr lang="en-AU" altLang="en-US" sz="1000">
-                <a:latin typeface="Consolas" panose="020B0609020204030204" pitchFamily="49" charset="0"/>
-                <a:ea typeface="宋体" panose="02010600030101010101" pitchFamily="2" charset="-122"/>
+                <a:latin typeface="等线" panose="02010600030101010101" pitchFamily="2" charset="-122"/>
+                <a:ea typeface="等线" panose="02010600030101010101" pitchFamily="2" charset="-122"/>
+                <a:cs typeface="Courier New" panose="02070309020205020404" pitchFamily="49" charset="0"/>
               </a:rPr>
               <a:t>browsers, platforms, libraries,</a:t>
             </a:r>
             <a:r>
               <a:rPr lang="zh-CN" altLang="en-US" sz="1000">
-                <a:latin typeface="Consolas" panose="020B0609020204030204" pitchFamily="49" charset="0"/>
-                <a:ea typeface="宋体" panose="02010600030101010101" pitchFamily="2" charset="-122"/>
+                <a:latin typeface="等线" panose="02010600030101010101" pitchFamily="2" charset="-122"/>
+                <a:ea typeface="等线" panose="02010600030101010101" pitchFamily="2" charset="-122"/>
+                <a:cs typeface="Courier New" panose="02070309020205020404" pitchFamily="49" charset="0"/>
               </a:rPr>
               <a:t> frameworks,</a:t>
             </a:r>
             <a:r>
               <a:rPr lang="en-AU" altLang="en-US" sz="1000">
-                <a:latin typeface="Consolas" panose="020B0609020204030204" pitchFamily="49" charset="0"/>
-                <a:ea typeface="宋体" panose="02010600030101010101" pitchFamily="2" charset="-122"/>
+                <a:latin typeface="等线" panose="02010600030101010101" pitchFamily="2" charset="-122"/>
+                <a:ea typeface="等线" panose="02010600030101010101" pitchFamily="2" charset="-122"/>
+                <a:cs typeface="Courier New" panose="02070309020205020404" pitchFamily="49" charset="0"/>
               </a:rPr>
               <a:t> </a:t>
             </a:r>
             <a:r>
               <a:rPr lang="zh-CN" altLang="en-US" sz="1000">
-                <a:latin typeface="Consolas" panose="020B0609020204030204" pitchFamily="49" charset="0"/>
-                <a:ea typeface="宋体" panose="02010600030101010101" pitchFamily="2" charset="-122"/>
+                <a:latin typeface="等线" panose="02010600030101010101" pitchFamily="2" charset="-122"/>
+                <a:ea typeface="等线" panose="02010600030101010101" pitchFamily="2" charset="-122"/>
+                <a:cs typeface="Courier New" panose="02070309020205020404" pitchFamily="49" charset="0"/>
               </a:rPr>
               <a:t>tools etc.)</a:t>
             </a:r>
@@ -5156,8 +5204,9 @@
                 <a:solidFill>
                   <a:schemeClr val="bg1"/>
                 </a:solidFill>
-                <a:latin typeface="Consolas" panose="020B0609020204030204" pitchFamily="49" charset="0"/>
-                <a:ea typeface="宋体" panose="02010600030101010101" pitchFamily="2" charset="-122"/>
+                <a:latin typeface="等线" panose="02010600030101010101" pitchFamily="2" charset="-122"/>
+                <a:ea typeface="等线" panose="02010600030101010101" pitchFamily="2" charset="-122"/>
+                <a:cs typeface="Courier New" panose="02070309020205020404" pitchFamily="49" charset="0"/>
               </a:rPr>
               <a:t>Build</a:t>
             </a:r>
@@ -5221,8 +5270,9 @@
                 <a:solidFill>
                   <a:schemeClr val="bg1"/>
                 </a:solidFill>
-                <a:latin typeface="Consolas" panose="020B0609020204030204" pitchFamily="49" charset="0"/>
-                <a:ea typeface="宋体" panose="02010600030101010101" pitchFamily="2" charset="-122"/>
+                <a:latin typeface="等线" panose="02010600030101010101" pitchFamily="2" charset="-122"/>
+                <a:ea typeface="等线" panose="02010600030101010101" pitchFamily="2" charset="-122"/>
+                <a:cs typeface="Courier New" panose="02070309020205020404" pitchFamily="49" charset="0"/>
               </a:rPr>
               <a:t>Grunt</a:t>
             </a:r>
@@ -5286,8 +5336,9 @@
                 <a:solidFill>
                   <a:schemeClr val="bg1"/>
                 </a:solidFill>
-                <a:latin typeface="Consolas" panose="020B0609020204030204" pitchFamily="49" charset="0"/>
-                <a:ea typeface="宋体" panose="02010600030101010101" pitchFamily="2" charset="-122"/>
+                <a:latin typeface="等线" panose="02010600030101010101" pitchFamily="2" charset="-122"/>
+                <a:ea typeface="等线" panose="02010600030101010101" pitchFamily="2" charset="-122"/>
+                <a:cs typeface="Courier New" panose="02070309020205020404" pitchFamily="49" charset="0"/>
               </a:rPr>
               <a:t>Gulp</a:t>
             </a:r>
@@ -5351,8 +5402,9 @@
                 <a:solidFill>
                   <a:schemeClr val="bg1"/>
                 </a:solidFill>
-                <a:latin typeface="Consolas" panose="020B0609020204030204" pitchFamily="49" charset="0"/>
-                <a:ea typeface="宋体" panose="02010600030101010101" pitchFamily="2" charset="-122"/>
+                <a:latin typeface="等线" panose="02010600030101010101" pitchFamily="2" charset="-122"/>
+                <a:ea typeface="等线" panose="02010600030101010101" pitchFamily="2" charset="-122"/>
+                <a:cs typeface="Courier New" panose="02070309020205020404" pitchFamily="49" charset="0"/>
               </a:rPr>
               <a:t>Brunch</a:t>
             </a:r>
@@ -5422,7 +5474,9 @@
                 <a:solidFill>
                   <a:schemeClr val="bg1"/>
                 </a:solidFill>
-                <a:latin typeface="Consolas" panose="020B0609020204030204" pitchFamily="49" charset="0"/>
+                <a:latin typeface="等线" panose="02010600030101010101" pitchFamily="2" charset="-122"/>
+                <a:ea typeface="等线" panose="02010600030101010101" pitchFamily="2" charset="-122"/>
+                <a:cs typeface="Courier New" panose="02070309020205020404" pitchFamily="49" charset="0"/>
               </a:rPr>
               <a:t>Editors</a:t>
             </a:r>
@@ -5486,8 +5540,9 @@
                 <a:solidFill>
                   <a:schemeClr val="bg1"/>
                 </a:solidFill>
-                <a:latin typeface="Consolas" panose="020B0609020204030204" pitchFamily="49" charset="0"/>
-                <a:ea typeface="宋体" panose="02010600030101010101" pitchFamily="2" charset="-122"/>
+                <a:latin typeface="等线" panose="02010600030101010101" pitchFamily="2" charset="-122"/>
+                <a:ea typeface="等线" panose="02010600030101010101" pitchFamily="2" charset="-122"/>
+                <a:cs typeface="Courier New" panose="02070309020205020404" pitchFamily="49" charset="0"/>
               </a:rPr>
               <a:t>Sublime Text</a:t>
             </a:r>
@@ -5551,8 +5606,9 @@
                 <a:solidFill>
                   <a:schemeClr val="bg1"/>
                 </a:solidFill>
-                <a:latin typeface="Consolas" panose="020B0609020204030204" pitchFamily="49" charset="0"/>
-                <a:ea typeface="宋体" panose="02010600030101010101" pitchFamily="2" charset="-122"/>
+                <a:latin typeface="等线" panose="02010600030101010101" pitchFamily="2" charset="-122"/>
+                <a:ea typeface="等线" panose="02010600030101010101" pitchFamily="2" charset="-122"/>
+                <a:cs typeface="Courier New" panose="02070309020205020404" pitchFamily="49" charset="0"/>
               </a:rPr>
               <a:t>WebStorm</a:t>
             </a:r>
@@ -5616,8 +5672,9 @@
                 <a:solidFill>
                   <a:schemeClr val="bg1"/>
                 </a:solidFill>
-                <a:latin typeface="Consolas" panose="020B0609020204030204" pitchFamily="49" charset="0"/>
-                <a:ea typeface="宋体" panose="02010600030101010101" pitchFamily="2" charset="-122"/>
+                <a:latin typeface="等线" panose="02010600030101010101" pitchFamily="2" charset="-122"/>
+                <a:ea typeface="等线" panose="02010600030101010101" pitchFamily="2" charset="-122"/>
+                <a:cs typeface="Courier New" panose="02070309020205020404" pitchFamily="49" charset="0"/>
               </a:rPr>
               <a:t>Atom</a:t>
             </a:r>
@@ -5681,8 +5738,9 @@
                 <a:solidFill>
                   <a:schemeClr val="bg1"/>
                 </a:solidFill>
-                <a:latin typeface="Consolas" panose="020B0609020204030204" pitchFamily="49" charset="0"/>
-                <a:ea typeface="宋体" panose="02010600030101010101" pitchFamily="2" charset="-122"/>
+                <a:latin typeface="等线" panose="02010600030101010101" pitchFamily="2" charset="-122"/>
+                <a:ea typeface="等线" panose="02010600030101010101" pitchFamily="2" charset="-122"/>
+                <a:cs typeface="Courier New" panose="02070309020205020404" pitchFamily="49" charset="0"/>
               </a:rPr>
               <a:t>Vim</a:t>
             </a:r>
@@ -5746,8 +5804,9 @@
                 <a:solidFill>
                   <a:schemeClr val="bg1"/>
                 </a:solidFill>
-                <a:latin typeface="Consolas" panose="020B0609020204030204" pitchFamily="49" charset="0"/>
-                <a:ea typeface="宋体" panose="02010600030101010101" pitchFamily="2" charset="-122"/>
+                <a:latin typeface="等线" panose="02010600030101010101" pitchFamily="2" charset="-122"/>
+                <a:ea typeface="等线" panose="02010600030101010101" pitchFamily="2" charset="-122"/>
+                <a:cs typeface="Courier New" panose="02070309020205020404" pitchFamily="49" charset="0"/>
               </a:rPr>
               <a:t>Brackets</a:t>
             </a:r>
@@ -5811,8 +5870,9 @@
                 <a:solidFill>
                   <a:schemeClr val="bg1"/>
                 </a:solidFill>
-                <a:latin typeface="Consolas" panose="020B0609020204030204" pitchFamily="49" charset="0"/>
-                <a:ea typeface="宋体" panose="02010600030101010101" pitchFamily="2" charset="-122"/>
+                <a:latin typeface="等线" panose="02010600030101010101" pitchFamily="2" charset="-122"/>
+                <a:ea typeface="等线" panose="02010600030101010101" pitchFamily="2" charset="-122"/>
+                <a:cs typeface="Courier New" panose="02070309020205020404" pitchFamily="49" charset="0"/>
               </a:rPr>
               <a:t>Light Table</a:t>
             </a:r>
@@ -5882,7 +5942,9 @@
                 <a:solidFill>
                   <a:schemeClr val="bg1"/>
                 </a:solidFill>
-                <a:latin typeface="Consolas" panose="020B0609020204030204" pitchFamily="49" charset="0"/>
+                <a:latin typeface="等线" panose="02010600030101010101" pitchFamily="2" charset="-122"/>
+                <a:ea typeface="等线" panose="02010600030101010101" pitchFamily="2" charset="-122"/>
+                <a:cs typeface="Courier New" panose="02070309020205020404" pitchFamily="49" charset="0"/>
               </a:rPr>
               <a:t>Test</a:t>
             </a:r>
@@ -5900,7 +5962,7 @@
         <p:spPr bwMode="auto">
           <a:xfrm>
             <a:off x="765175" y="187325"/>
-            <a:ext cx="1682750" cy="212725"/>
+            <a:ext cx="1505540" cy="215444"/>
           </a:xfrm>
           <a:prstGeom prst="rect">
             <a:avLst/>
@@ -5947,22 +6009,25 @@
           <a:p>
             <a:r>
               <a:rPr lang="zh-CN" altLang="en-US" sz="800">
-                <a:latin typeface="Consolas" panose="020B0609020204030204" pitchFamily="49" charset="0"/>
-                <a:ea typeface="宋体" panose="02010600030101010101" pitchFamily="2" charset="-122"/>
+                <a:latin typeface="等线" panose="02010600030101010101" pitchFamily="2" charset="-122"/>
+                <a:ea typeface="等线" panose="02010600030101010101" pitchFamily="2" charset="-122"/>
+                <a:cs typeface="Courier New" panose="02070309020205020404" pitchFamily="49" charset="0"/>
               </a:rPr>
               <a:t>Wilson Chen 11/0</a:t>
             </a:r>
             <a:r>
               <a:rPr lang="en-AU" altLang="en-US" sz="800">
-                <a:latin typeface="Consolas" panose="020B0609020204030204" pitchFamily="49" charset="0"/>
-                <a:ea typeface="宋体" panose="02010600030101010101" pitchFamily="2" charset="-122"/>
+                <a:latin typeface="等线" panose="02010600030101010101" pitchFamily="2" charset="-122"/>
+                <a:ea typeface="等线" panose="02010600030101010101" pitchFamily="2" charset="-122"/>
+                <a:cs typeface="Courier New" panose="02070309020205020404" pitchFamily="49" charset="0"/>
               </a:rPr>
               <a:t>8</a:t>
             </a:r>
             <a:r>
               <a:rPr lang="zh-CN" altLang="en-US" sz="800">
-                <a:latin typeface="Consolas" panose="020B0609020204030204" pitchFamily="49" charset="0"/>
-                <a:ea typeface="宋体" panose="02010600030101010101" pitchFamily="2" charset="-122"/>
+                <a:latin typeface="等线" panose="02010600030101010101" pitchFamily="2" charset="-122"/>
+                <a:ea typeface="等线" panose="02010600030101010101" pitchFamily="2" charset="-122"/>
+                <a:cs typeface="Courier New" panose="02070309020205020404" pitchFamily="49" charset="0"/>
               </a:rPr>
               <a:t>/2015 v1.7</a:t>
             </a:r>
@@ -6032,7 +6097,9 @@
                 <a:solidFill>
                   <a:schemeClr val="bg1"/>
                 </a:solidFill>
-                <a:latin typeface="Consolas" panose="020B0609020204030204" pitchFamily="49" charset="0"/>
+                <a:latin typeface="等线" panose="02010600030101010101" pitchFamily="2" charset="-122"/>
+                <a:ea typeface="等线" panose="02010600030101010101" pitchFamily="2" charset="-122"/>
+                <a:cs typeface="Courier New" panose="02070309020205020404" pitchFamily="49" charset="0"/>
               </a:rPr>
               <a:t> JS </a:t>
             </a:r>
@@ -6041,8 +6108,9 @@
                 <a:solidFill>
                   <a:schemeClr val="bg1"/>
                 </a:solidFill>
-                <a:latin typeface="Consolas" panose="020B0609020204030204" pitchFamily="49" charset="0"/>
-                <a:ea typeface="宋体" panose="02010600030101010101" pitchFamily="2" charset="-122"/>
+                <a:latin typeface="等线" panose="02010600030101010101" pitchFamily="2" charset="-122"/>
+                <a:ea typeface="等线" panose="02010600030101010101" pitchFamily="2" charset="-122"/>
+                <a:cs typeface="Courier New" panose="02070309020205020404" pitchFamily="49" charset="0"/>
               </a:rPr>
               <a:t>base librar</a:t>
             </a:r>
@@ -6051,7 +6119,9 @@
                 <a:solidFill>
                   <a:schemeClr val="bg1"/>
                 </a:solidFill>
-                <a:latin typeface="Consolas" panose="020B0609020204030204" pitchFamily="49" charset="0"/>
+                <a:latin typeface="等线" panose="02010600030101010101" pitchFamily="2" charset="-122"/>
+                <a:ea typeface="等线" panose="02010600030101010101" pitchFamily="2" charset="-122"/>
+                <a:cs typeface="Courier New" panose="02070309020205020404" pitchFamily="49" charset="0"/>
               </a:rPr>
               <a:t>ies</a:t>
             </a:r>
@@ -6059,8 +6129,9 @@
               <a:solidFill>
                 <a:schemeClr val="bg1"/>
               </a:solidFill>
-              <a:latin typeface="Consolas" panose="020B0609020204030204" pitchFamily="49" charset="0"/>
-              <a:ea typeface="宋体" panose="02010600030101010101" pitchFamily="2" charset="-122"/>
+              <a:latin typeface="等线" panose="02010600030101010101" pitchFamily="2" charset="-122"/>
+              <a:ea typeface="等线" panose="02010600030101010101" pitchFamily="2" charset="-122"/>
+              <a:cs typeface="Courier New" panose="02070309020205020404" pitchFamily="49" charset="0"/>
             </a:endParaRPr>
           </a:p>
         </p:txBody>
@@ -6122,8 +6193,9 @@
                 <a:solidFill>
                   <a:schemeClr val="bg1"/>
                 </a:solidFill>
-                <a:latin typeface="Consolas" panose="020B0609020204030204" pitchFamily="49" charset="0"/>
-                <a:ea typeface="宋体" panose="02010600030101010101" pitchFamily="2" charset="-122"/>
+                <a:latin typeface="等线" panose="02010600030101010101" pitchFamily="2" charset="-122"/>
+                <a:ea typeface="等线" panose="02010600030101010101" pitchFamily="2" charset="-122"/>
+                <a:cs typeface="Courier New" panose="02070309020205020404" pitchFamily="49" charset="0"/>
               </a:rPr>
               <a:t>jQuery</a:t>
             </a:r>
@@ -6187,8 +6259,9 @@
                 <a:solidFill>
                   <a:schemeClr val="bg1"/>
                 </a:solidFill>
-                <a:latin typeface="Consolas" panose="020B0609020204030204" pitchFamily="49" charset="0"/>
-                <a:ea typeface="宋体" panose="02010600030101010101" pitchFamily="2" charset="-122"/>
+                <a:latin typeface="等线" panose="02010600030101010101" pitchFamily="2" charset="-122"/>
+                <a:ea typeface="等线" panose="02010600030101010101" pitchFamily="2" charset="-122"/>
+                <a:cs typeface="Courier New" panose="02070309020205020404" pitchFamily="49" charset="0"/>
               </a:rPr>
               <a:t>Prototype</a:t>
             </a:r>
@@ -6252,8 +6325,9 @@
                 <a:solidFill>
                   <a:schemeClr val="bg1"/>
                 </a:solidFill>
-                <a:latin typeface="Consolas" panose="020B0609020204030204" pitchFamily="49" charset="0"/>
-                <a:ea typeface="宋体" panose="02010600030101010101" pitchFamily="2" charset="-122"/>
+                <a:latin typeface="等线" panose="02010600030101010101" pitchFamily="2" charset="-122"/>
+                <a:ea typeface="等线" panose="02010600030101010101" pitchFamily="2" charset="-122"/>
+                <a:cs typeface="Courier New" panose="02070309020205020404" pitchFamily="49" charset="0"/>
               </a:rPr>
               <a:t>Zepto</a:t>
             </a:r>
@@ -6317,8 +6391,9 @@
                 <a:solidFill>
                   <a:schemeClr val="bg1"/>
                 </a:solidFill>
-                <a:latin typeface="Consolas" panose="020B0609020204030204" pitchFamily="49" charset="0"/>
-                <a:ea typeface="宋体" panose="02010600030101010101" pitchFamily="2" charset="-122"/>
+                <a:latin typeface="等线" panose="02010600030101010101" pitchFamily="2" charset="-122"/>
+                <a:ea typeface="等线" panose="02010600030101010101" pitchFamily="2" charset="-122"/>
+                <a:cs typeface="Courier New" panose="02070309020205020404" pitchFamily="49" charset="0"/>
               </a:rPr>
               <a:t>MooTools</a:t>
             </a:r>
@@ -6387,8 +6462,9 @@
               <a:solidFill>
                 <a:schemeClr val="bg1"/>
               </a:solidFill>
-              <a:latin typeface="Consolas" panose="020B0609020204030204" pitchFamily="49" charset="0"/>
-              <a:ea typeface="宋体" panose="02010600030101010101" pitchFamily="2" charset="-122"/>
+              <a:latin typeface="等线" panose="02010600030101010101" pitchFamily="2" charset="-122"/>
+              <a:ea typeface="等线" panose="02010600030101010101" pitchFamily="2" charset="-122"/>
+              <a:cs typeface="Courier New" panose="02070309020205020404" pitchFamily="49" charset="0"/>
             </a:endParaRPr>
           </a:p>
           <a:p>
@@ -6398,8 +6474,9 @@
                 <a:solidFill>
                   <a:schemeClr val="bg1"/>
                 </a:solidFill>
-                <a:latin typeface="Consolas" panose="020B0609020204030204" pitchFamily="49" charset="0"/>
-                <a:ea typeface="宋体" panose="02010600030101010101" pitchFamily="2" charset="-122"/>
+                <a:latin typeface="等线" panose="02010600030101010101" pitchFamily="2" charset="-122"/>
+                <a:ea typeface="等线" panose="02010600030101010101" pitchFamily="2" charset="-122"/>
+                <a:cs typeface="Courier New" panose="02070309020205020404" pitchFamily="49" charset="0"/>
               </a:rPr>
               <a:t>Template</a:t>
             </a:r>
@@ -6410,8 +6487,9 @@
               <a:solidFill>
                 <a:schemeClr val="bg1"/>
               </a:solidFill>
-              <a:latin typeface="Consolas" panose="020B0609020204030204" pitchFamily="49" charset="0"/>
-              <a:ea typeface="宋体" panose="02010600030101010101" pitchFamily="2" charset="-122"/>
+              <a:latin typeface="等线" panose="02010600030101010101" pitchFamily="2" charset="-122"/>
+              <a:ea typeface="等线" panose="02010600030101010101" pitchFamily="2" charset="-122"/>
+              <a:cs typeface="Courier New" panose="02070309020205020404" pitchFamily="49" charset="0"/>
             </a:endParaRPr>
           </a:p>
         </p:txBody>
@@ -6473,8 +6551,9 @@
                 <a:solidFill>
                   <a:schemeClr val="bg1"/>
                 </a:solidFill>
-                <a:latin typeface="Consolas" panose="020B0609020204030204" pitchFamily="49" charset="0"/>
-                <a:ea typeface="宋体" panose="02010600030101010101" pitchFamily="2" charset="-122"/>
+                <a:latin typeface="等线" panose="02010600030101010101" pitchFamily="2" charset="-122"/>
+                <a:ea typeface="等线" panose="02010600030101010101" pitchFamily="2" charset="-122"/>
+                <a:cs typeface="Courier New" panose="02070309020205020404" pitchFamily="49" charset="0"/>
               </a:rPr>
               <a:t>Markdown</a:t>
             </a:r>
@@ -6538,8 +6617,9 @@
                 <a:solidFill>
                   <a:schemeClr val="bg1"/>
                 </a:solidFill>
-                <a:latin typeface="Consolas" panose="020B0609020204030204" pitchFamily="49" charset="0"/>
-                <a:ea typeface="宋体" panose="02010600030101010101" pitchFamily="2" charset="-122"/>
+                <a:latin typeface="等线" panose="02010600030101010101" pitchFamily="2" charset="-122"/>
+                <a:ea typeface="等线" panose="02010600030101010101" pitchFamily="2" charset="-122"/>
+                <a:cs typeface="Courier New" panose="02070309020205020404" pitchFamily="49" charset="0"/>
               </a:rPr>
               <a:t>Haml</a:t>
             </a:r>
@@ -6603,8 +6683,9 @@
                 <a:solidFill>
                   <a:schemeClr val="bg1"/>
                 </a:solidFill>
-                <a:latin typeface="Consolas" panose="020B0609020204030204" pitchFamily="49" charset="0"/>
-                <a:ea typeface="宋体" panose="02010600030101010101" pitchFamily="2" charset="-122"/>
+                <a:latin typeface="等线" panose="02010600030101010101" pitchFamily="2" charset="-122"/>
+                <a:ea typeface="等线" panose="02010600030101010101" pitchFamily="2" charset="-122"/>
+                <a:cs typeface="Courier New" panose="02070309020205020404" pitchFamily="49" charset="0"/>
               </a:rPr>
               <a:t>Handlebars</a:t>
             </a:r>
@@ -6674,8 +6755,9 @@
                 <a:solidFill>
                   <a:schemeClr val="bg1"/>
                 </a:solidFill>
-                <a:latin typeface="Consolas" panose="020B0609020204030204" pitchFamily="49" charset="0"/>
-                <a:ea typeface="宋体" panose="02010600030101010101" pitchFamily="2" charset="-122"/>
+                <a:latin typeface="等线" panose="02010600030101010101" pitchFamily="2" charset="-122"/>
+                <a:ea typeface="等线" panose="02010600030101010101" pitchFamily="2" charset="-122"/>
+                <a:cs typeface="Courier New" panose="02070309020205020404" pitchFamily="49" charset="0"/>
               </a:rPr>
               <a:t> Modern</a:t>
             </a:r>
@@ -6739,8 +6821,9 @@
                 <a:solidFill>
                   <a:schemeClr val="bg1"/>
                 </a:solidFill>
-                <a:latin typeface="Consolas" panose="020B0609020204030204" pitchFamily="49" charset="0"/>
-                <a:ea typeface="宋体" panose="02010600030101010101" pitchFamily="2" charset="-122"/>
+                <a:latin typeface="等线" panose="02010600030101010101" pitchFamily="2" charset="-122"/>
+                <a:ea typeface="等线" panose="02010600030101010101" pitchFamily="2" charset="-122"/>
+                <a:cs typeface="Courier New" panose="02070309020205020404" pitchFamily="49" charset="0"/>
               </a:rPr>
               <a:t>Normalize</a:t>
             </a:r>
@@ -6804,8 +6887,9 @@
                 <a:solidFill>
                   <a:schemeClr val="bg1"/>
                 </a:solidFill>
-                <a:latin typeface="Consolas" panose="020B0609020204030204" pitchFamily="49" charset="0"/>
-                <a:ea typeface="宋体" panose="02010600030101010101" pitchFamily="2" charset="-122"/>
+                <a:latin typeface="等线" panose="02010600030101010101" pitchFamily="2" charset="-122"/>
+                <a:ea typeface="等线" panose="02010600030101010101" pitchFamily="2" charset="-122"/>
+                <a:cs typeface="Courier New" panose="02070309020205020404" pitchFamily="49" charset="0"/>
               </a:rPr>
               <a:t>Reset</a:t>
             </a:r>
@@ -6875,7 +6959,9 @@
                 <a:solidFill>
                   <a:schemeClr val="bg1"/>
                 </a:solidFill>
-                <a:latin typeface="Consolas" panose="020B0609020204030204" pitchFamily="49" charset="0"/>
+                <a:latin typeface="等线" panose="02010600030101010101" pitchFamily="2" charset="-122"/>
+                <a:ea typeface="等线" panose="02010600030101010101" pitchFamily="2" charset="-122"/>
+                <a:cs typeface="Courier New" panose="02070309020205020404" pitchFamily="49" charset="0"/>
               </a:rPr>
               <a:t>Practices</a:t>
             </a:r>
@@ -6939,8 +7025,9 @@
                 <a:solidFill>
                   <a:schemeClr val="bg1"/>
                 </a:solidFill>
-                <a:latin typeface="Consolas" panose="020B0609020204030204" pitchFamily="49" charset="0"/>
-                <a:ea typeface="宋体" panose="02010600030101010101" pitchFamily="2" charset="-122"/>
+                <a:latin typeface="等线" panose="02010600030101010101" pitchFamily="2" charset="-122"/>
+                <a:ea typeface="等线" panose="02010600030101010101" pitchFamily="2" charset="-122"/>
+                <a:cs typeface="Courier New" panose="02070309020205020404" pitchFamily="49" charset="0"/>
               </a:rPr>
               <a:t>Responsiveness</a:t>
             </a:r>
@@ -7004,8 +7091,9 @@
                 <a:solidFill>
                   <a:schemeClr val="bg1"/>
                 </a:solidFill>
-                <a:latin typeface="Consolas" panose="020B0609020204030204" pitchFamily="49" charset="0"/>
-                <a:ea typeface="宋体" panose="02010600030101010101" pitchFamily="2" charset="-122"/>
+                <a:latin typeface="等线" panose="02010600030101010101" pitchFamily="2" charset="-122"/>
+                <a:ea typeface="等线" panose="02010600030101010101" pitchFamily="2" charset="-122"/>
+                <a:cs typeface="Courier New" panose="02070309020205020404" pitchFamily="49" charset="0"/>
               </a:rPr>
               <a:t>SEO</a:t>
             </a:r>
@@ -7075,8 +7163,9 @@
                 <a:solidFill>
                   <a:schemeClr val="bg1"/>
                 </a:solidFill>
-                <a:latin typeface="Consolas" panose="020B0609020204030204" pitchFamily="49" charset="0"/>
-                <a:ea typeface="宋体" panose="02010600030101010101" pitchFamily="2" charset="-122"/>
+                <a:latin typeface="等线" panose="02010600030101010101" pitchFamily="2" charset="-122"/>
+                <a:ea typeface="等线" panose="02010600030101010101" pitchFamily="2" charset="-122"/>
+                <a:cs typeface="Courier New" panose="02070309020205020404" pitchFamily="49" charset="0"/>
               </a:rPr>
               <a:t>Security</a:t>
             </a:r>
@@ -7140,8 +7229,9 @@
                 <a:solidFill>
                   <a:schemeClr val="bg1"/>
                 </a:solidFill>
-                <a:latin typeface="Consolas" panose="020B0609020204030204" pitchFamily="49" charset="0"/>
-                <a:ea typeface="宋体" panose="02010600030101010101" pitchFamily="2" charset="-122"/>
+                <a:latin typeface="等线" panose="02010600030101010101" pitchFamily="2" charset="-122"/>
+                <a:ea typeface="等线" panose="02010600030101010101" pitchFamily="2" charset="-122"/>
+                <a:cs typeface="Courier New" panose="02070309020205020404" pitchFamily="49" charset="0"/>
               </a:rPr>
               <a:t>Sandbox</a:t>
             </a:r>
@@ -7205,8 +7295,9 @@
                 <a:solidFill>
                   <a:schemeClr val="bg1"/>
                 </a:solidFill>
-                <a:latin typeface="Consolas" panose="020B0609020204030204" pitchFamily="49" charset="0"/>
-                <a:ea typeface="宋体" panose="02010600030101010101" pitchFamily="2" charset="-122"/>
+                <a:latin typeface="等线" panose="02010600030101010101" pitchFamily="2" charset="-122"/>
+                <a:ea typeface="等线" panose="02010600030101010101" pitchFamily="2" charset="-122"/>
+                <a:cs typeface="Courier New" panose="02070309020205020404" pitchFamily="49" charset="0"/>
               </a:rPr>
               <a:t>XSS</a:t>
             </a:r>
@@ -7270,8 +7361,9 @@
                 <a:solidFill>
                   <a:schemeClr val="bg1"/>
                 </a:solidFill>
-                <a:latin typeface="Consolas" panose="020B0609020204030204" pitchFamily="49" charset="0"/>
-                <a:ea typeface="宋体" panose="02010600030101010101" pitchFamily="2" charset="-122"/>
+                <a:latin typeface="等线" panose="02010600030101010101" pitchFamily="2" charset="-122"/>
+                <a:ea typeface="等线" panose="02010600030101010101" pitchFamily="2" charset="-122"/>
+                <a:cs typeface="Courier New" panose="02070309020205020404" pitchFamily="49" charset="0"/>
               </a:rPr>
               <a:t>WebDriverJS</a:t>
             </a:r>
@@ -7335,8 +7427,9 @@
                 <a:solidFill>
                   <a:schemeClr val="bg1"/>
                 </a:solidFill>
-                <a:latin typeface="Consolas" panose="020B0609020204030204" pitchFamily="49" charset="0"/>
-                <a:ea typeface="宋体" panose="02010600030101010101" pitchFamily="2" charset="-122"/>
+                <a:latin typeface="等线" panose="02010600030101010101" pitchFamily="2" charset="-122"/>
+                <a:ea typeface="等线" panose="02010600030101010101" pitchFamily="2" charset="-122"/>
+                <a:cs typeface="Courier New" panose="02070309020205020404" pitchFamily="49" charset="0"/>
               </a:rPr>
               <a:t>QUnit</a:t>
             </a:r>
@@ -7400,8 +7493,9 @@
                 <a:solidFill>
                   <a:schemeClr val="bg1"/>
                 </a:solidFill>
-                <a:latin typeface="Consolas" panose="020B0609020204030204" pitchFamily="49" charset="0"/>
-                <a:ea typeface="宋体" panose="02010600030101010101" pitchFamily="2" charset="-122"/>
+                <a:latin typeface="等线" panose="02010600030101010101" pitchFamily="2" charset="-122"/>
+                <a:ea typeface="等线" panose="02010600030101010101" pitchFamily="2" charset="-122"/>
+                <a:cs typeface="Courier New" panose="02070309020205020404" pitchFamily="49" charset="0"/>
               </a:rPr>
               <a:t>Jasmine</a:t>
             </a:r>
@@ -7465,8 +7559,9 @@
                 <a:solidFill>
                   <a:schemeClr val="bg1"/>
                 </a:solidFill>
-                <a:latin typeface="Consolas" panose="020B0609020204030204" pitchFamily="49" charset="0"/>
-                <a:ea typeface="宋体" panose="02010600030101010101" pitchFamily="2" charset="-122"/>
+                <a:latin typeface="等线" panose="02010600030101010101" pitchFamily="2" charset="-122"/>
+                <a:ea typeface="等线" panose="02010600030101010101" pitchFamily="2" charset="-122"/>
+                <a:cs typeface="Courier New" panose="02070309020205020404" pitchFamily="49" charset="0"/>
               </a:rPr>
               <a:t>Mocha</a:t>
             </a:r>
@@ -7530,8 +7625,9 @@
                 <a:solidFill>
                   <a:schemeClr val="bg1"/>
                 </a:solidFill>
-                <a:latin typeface="Consolas" panose="020B0609020204030204" pitchFamily="49" charset="0"/>
-                <a:ea typeface="宋体" panose="02010600030101010101" pitchFamily="2" charset="-122"/>
+                <a:latin typeface="等线" panose="02010600030101010101" pitchFamily="2" charset="-122"/>
+                <a:ea typeface="等线" panose="02010600030101010101" pitchFamily="2" charset="-122"/>
+                <a:cs typeface="Courier New" panose="02070309020205020404" pitchFamily="49" charset="0"/>
               </a:rPr>
               <a:t>Protractor</a:t>
             </a:r>
@@ -7595,8 +7691,9 @@
                 <a:solidFill>
                   <a:schemeClr val="bg1"/>
                 </a:solidFill>
-                <a:latin typeface="Consolas" panose="020B0609020204030204" pitchFamily="49" charset="0"/>
-                <a:ea typeface="宋体" panose="02010600030101010101" pitchFamily="2" charset="-122"/>
+                <a:latin typeface="等线" panose="02010600030101010101" pitchFamily="2" charset="-122"/>
+                <a:ea typeface="等线" panose="02010600030101010101" pitchFamily="2" charset="-122"/>
+                <a:cs typeface="Courier New" panose="02070309020205020404" pitchFamily="49" charset="0"/>
               </a:rPr>
               <a:t>Cake</a:t>
             </a:r>
@@ -7666,7 +7763,9 @@
                 <a:solidFill>
                   <a:schemeClr val="bg1"/>
                 </a:solidFill>
-                <a:latin typeface="Consolas" panose="020B0609020204030204" pitchFamily="49" charset="0"/>
+                <a:latin typeface="等线" panose="02010600030101010101" pitchFamily="2" charset="-122"/>
+                <a:ea typeface="等线" panose="02010600030101010101" pitchFamily="2" charset="-122"/>
+                <a:cs typeface="Courier New" panose="02070309020205020404" pitchFamily="49" charset="0"/>
               </a:rPr>
               <a:t>JS </a:t>
             </a:r>
@@ -7675,8 +7774,9 @@
                 <a:solidFill>
                   <a:schemeClr val="bg1"/>
                 </a:solidFill>
-                <a:latin typeface="Consolas" panose="020B0609020204030204" pitchFamily="49" charset="0"/>
-                <a:ea typeface="宋体" panose="02010600030101010101" pitchFamily="2" charset="-122"/>
+                <a:latin typeface="等线" panose="02010600030101010101" pitchFamily="2" charset="-122"/>
+                <a:ea typeface="等线" panose="02010600030101010101" pitchFamily="2" charset="-122"/>
+                <a:cs typeface="Courier New" panose="02070309020205020404" pitchFamily="49" charset="0"/>
               </a:rPr>
               <a:t>framework</a:t>
             </a:r>
@@ -7685,7 +7785,9 @@
                 <a:solidFill>
                   <a:schemeClr val="bg1"/>
                 </a:solidFill>
-                <a:latin typeface="Consolas" panose="020B0609020204030204" pitchFamily="49" charset="0"/>
+                <a:latin typeface="等线" panose="02010600030101010101" pitchFamily="2" charset="-122"/>
+                <a:ea typeface="等线" panose="02010600030101010101" pitchFamily="2" charset="-122"/>
+                <a:cs typeface="Courier New" panose="02070309020205020404" pitchFamily="49" charset="0"/>
               </a:rPr>
               <a:t>s</a:t>
             </a:r>
@@ -7693,8 +7795,9 @@
               <a:solidFill>
                 <a:schemeClr val="bg1"/>
               </a:solidFill>
-              <a:latin typeface="Consolas" panose="020B0609020204030204" pitchFamily="49" charset="0"/>
-              <a:ea typeface="宋体" panose="02010600030101010101" pitchFamily="2" charset="-122"/>
+              <a:latin typeface="等线" panose="02010600030101010101" pitchFamily="2" charset="-122"/>
+              <a:ea typeface="等线" panose="02010600030101010101" pitchFamily="2" charset="-122"/>
+              <a:cs typeface="Courier New" panose="02070309020205020404" pitchFamily="49" charset="0"/>
             </a:endParaRPr>
           </a:p>
         </p:txBody>
@@ -7756,8 +7859,9 @@
                 <a:solidFill>
                   <a:schemeClr val="bg1"/>
                 </a:solidFill>
-                <a:latin typeface="Consolas" panose="020B0609020204030204" pitchFamily="49" charset="0"/>
-                <a:ea typeface="宋体" panose="02010600030101010101" pitchFamily="2" charset="-122"/>
+                <a:latin typeface="等线" panose="02010600030101010101" pitchFamily="2" charset="-122"/>
+                <a:ea typeface="等线" panose="02010600030101010101" pitchFamily="2" charset="-122"/>
+                <a:cs typeface="Courier New" panose="02070309020205020404" pitchFamily="49" charset="0"/>
               </a:rPr>
               <a:t>AngularJS</a:t>
             </a:r>
@@ -7821,8 +7925,9 @@
                 <a:solidFill>
                   <a:schemeClr val="bg1"/>
                 </a:solidFill>
-                <a:latin typeface="Consolas" panose="020B0609020204030204" pitchFamily="49" charset="0"/>
-                <a:ea typeface="宋体" panose="02010600030101010101" pitchFamily="2" charset="-122"/>
+                <a:latin typeface="等线" panose="02010600030101010101" pitchFamily="2" charset="-122"/>
+                <a:ea typeface="等线" panose="02010600030101010101" pitchFamily="2" charset="-122"/>
+                <a:cs typeface="Courier New" panose="02070309020205020404" pitchFamily="49" charset="0"/>
               </a:rPr>
               <a:t>Backbone</a:t>
             </a:r>
@@ -7886,8 +7991,9 @@
                 <a:solidFill>
                   <a:schemeClr val="bg1"/>
                 </a:solidFill>
-                <a:latin typeface="Consolas" panose="020B0609020204030204" pitchFamily="49" charset="0"/>
-                <a:ea typeface="宋体" panose="02010600030101010101" pitchFamily="2" charset="-122"/>
+                <a:latin typeface="等线" panose="02010600030101010101" pitchFamily="2" charset="-122"/>
+                <a:ea typeface="等线" panose="02010600030101010101" pitchFamily="2" charset="-122"/>
+                <a:cs typeface="Courier New" panose="02070309020205020404" pitchFamily="49" charset="0"/>
               </a:rPr>
               <a:t>Knockout</a:t>
             </a:r>
@@ -7951,8 +8057,9 @@
                 <a:solidFill>
                   <a:schemeClr val="bg1"/>
                 </a:solidFill>
-                <a:latin typeface="Consolas" panose="020B0609020204030204" pitchFamily="49" charset="0"/>
-                <a:ea typeface="宋体" panose="02010600030101010101" pitchFamily="2" charset="-122"/>
+                <a:latin typeface="等线" panose="02010600030101010101" pitchFamily="2" charset="-122"/>
+                <a:ea typeface="等线" panose="02010600030101010101" pitchFamily="2" charset="-122"/>
+                <a:cs typeface="Courier New" panose="02070309020205020404" pitchFamily="49" charset="0"/>
               </a:rPr>
               <a:t>Ember</a:t>
             </a:r>
@@ -8022,8 +8129,9 @@
                 <a:solidFill>
                   <a:schemeClr val="bg1"/>
                 </a:solidFill>
-                <a:latin typeface="Consolas" panose="020B0609020204030204" pitchFamily="49" charset="0"/>
-                <a:ea typeface="宋体" panose="02010600030101010101" pitchFamily="2" charset="-122"/>
+                <a:latin typeface="等线" panose="02010600030101010101" pitchFamily="2" charset="-122"/>
+                <a:ea typeface="等线" panose="02010600030101010101" pitchFamily="2" charset="-122"/>
+                <a:cs typeface="Courier New" panose="02070309020205020404" pitchFamily="49" charset="0"/>
               </a:rPr>
               <a:t>CSS Pre-processors</a:t>
             </a:r>
@@ -8087,8 +8195,9 @@
                 <a:solidFill>
                   <a:schemeClr val="bg1"/>
                 </a:solidFill>
-                <a:latin typeface="Consolas" panose="020B0609020204030204" pitchFamily="49" charset="0"/>
-                <a:ea typeface="宋体" panose="02010600030101010101" pitchFamily="2" charset="-122"/>
+                <a:latin typeface="等线" panose="02010600030101010101" pitchFamily="2" charset="-122"/>
+                <a:ea typeface="等线" panose="02010600030101010101" pitchFamily="2" charset="-122"/>
+                <a:cs typeface="Courier New" panose="02070309020205020404" pitchFamily="49" charset="0"/>
               </a:rPr>
               <a:t>SCSS</a:t>
             </a:r>
@@ -8100,8 +8209,9 @@
                 <a:solidFill>
                   <a:schemeClr val="bg1"/>
                 </a:solidFill>
-                <a:latin typeface="Consolas" panose="020B0609020204030204" pitchFamily="49" charset="0"/>
-                <a:ea typeface="宋体" panose="02010600030101010101" pitchFamily="2" charset="-122"/>
+                <a:latin typeface="等线" panose="02010600030101010101" pitchFamily="2" charset="-122"/>
+                <a:ea typeface="等线" panose="02010600030101010101" pitchFamily="2" charset="-122"/>
+                <a:cs typeface="Courier New" panose="02070309020205020404" pitchFamily="49" charset="0"/>
               </a:rPr>
               <a:t>(...)</a:t>
             </a:r>
@@ -8109,8 +8219,9 @@
               <a:solidFill>
                 <a:schemeClr val="bg1"/>
               </a:solidFill>
-              <a:latin typeface="Consolas" panose="020B0609020204030204" pitchFamily="49" charset="0"/>
-              <a:ea typeface="宋体" panose="02010600030101010101" pitchFamily="2" charset="-122"/>
+              <a:latin typeface="等线" panose="02010600030101010101" pitchFamily="2" charset="-122"/>
+              <a:ea typeface="等线" panose="02010600030101010101" pitchFamily="2" charset="-122"/>
+              <a:cs typeface="Courier New" panose="02070309020205020404" pitchFamily="49" charset="0"/>
             </a:endParaRPr>
           </a:p>
         </p:txBody>
@@ -8172,8 +8283,9 @@
                 <a:solidFill>
                   <a:schemeClr val="bg1"/>
                 </a:solidFill>
-                <a:latin typeface="Consolas" panose="020B0609020204030204" pitchFamily="49" charset="0"/>
-                <a:ea typeface="宋体" panose="02010600030101010101" pitchFamily="2" charset="-122"/>
+                <a:latin typeface="等线" panose="02010600030101010101" pitchFamily="2" charset="-122"/>
+                <a:ea typeface="等线" panose="02010600030101010101" pitchFamily="2" charset="-122"/>
+                <a:cs typeface="Courier New" panose="02070309020205020404" pitchFamily="49" charset="0"/>
               </a:rPr>
               <a:t>LESS </a:t>
             </a:r>
@@ -8185,8 +8297,9 @@
                 <a:solidFill>
                   <a:schemeClr val="bg1"/>
                 </a:solidFill>
-                <a:latin typeface="Consolas" panose="020B0609020204030204" pitchFamily="49" charset="0"/>
-                <a:ea typeface="宋体" panose="02010600030101010101" pitchFamily="2" charset="-122"/>
+                <a:latin typeface="等线" panose="02010600030101010101" pitchFamily="2" charset="-122"/>
+                <a:ea typeface="等线" panose="02010600030101010101" pitchFamily="2" charset="-122"/>
+                <a:cs typeface="Courier New" panose="02070309020205020404" pitchFamily="49" charset="0"/>
               </a:rPr>
               <a:t>(Hat)</a:t>
             </a:r>
@@ -8194,8 +8307,9 @@
               <a:solidFill>
                 <a:schemeClr val="bg1"/>
               </a:solidFill>
-              <a:latin typeface="Consolas" panose="020B0609020204030204" pitchFamily="49" charset="0"/>
-              <a:ea typeface="宋体" panose="02010600030101010101" pitchFamily="2" charset="-122"/>
+              <a:latin typeface="等线" panose="02010600030101010101" pitchFamily="2" charset="-122"/>
+              <a:ea typeface="等线" panose="02010600030101010101" pitchFamily="2" charset="-122"/>
+              <a:cs typeface="Courier New" panose="02070309020205020404" pitchFamily="49" charset="0"/>
             </a:endParaRPr>
           </a:p>
         </p:txBody>
@@ -8257,8 +8371,9 @@
                 <a:solidFill>
                   <a:schemeClr val="bg1"/>
                 </a:solidFill>
-                <a:latin typeface="Consolas" panose="020B0609020204030204" pitchFamily="49" charset="0"/>
-                <a:ea typeface="宋体" panose="02010600030101010101" pitchFamily="2" charset="-122"/>
+                <a:latin typeface="等线" panose="02010600030101010101" pitchFamily="2" charset="-122"/>
+                <a:ea typeface="等线" panose="02010600030101010101" pitchFamily="2" charset="-122"/>
+                <a:cs typeface="Courier New" panose="02070309020205020404" pitchFamily="49" charset="0"/>
               </a:rPr>
               <a:t>SASS</a:t>
             </a:r>
@@ -8270,8 +8385,9 @@
                 <a:solidFill>
                   <a:schemeClr val="bg1"/>
                 </a:solidFill>
-                <a:latin typeface="Consolas" panose="020B0609020204030204" pitchFamily="49" charset="0"/>
-                <a:ea typeface="宋体" panose="02010600030101010101" pitchFamily="2" charset="-122"/>
+                <a:latin typeface="等线" panose="02010600030101010101" pitchFamily="2" charset="-122"/>
+                <a:ea typeface="等线" panose="02010600030101010101" pitchFamily="2" charset="-122"/>
+                <a:cs typeface="Courier New" panose="02070309020205020404" pitchFamily="49" charset="0"/>
               </a:rPr>
               <a:t>(Compass, Bourbon, Gumby...)</a:t>
             </a:r>
@@ -8335,8 +8451,9 @@
                 <a:solidFill>
                   <a:schemeClr val="bg1"/>
                 </a:solidFill>
-                <a:latin typeface="Consolas" panose="020B0609020204030204" pitchFamily="49" charset="0"/>
-                <a:ea typeface="宋体" panose="02010600030101010101" pitchFamily="2" charset="-122"/>
+                <a:latin typeface="等线" panose="02010600030101010101" pitchFamily="2" charset="-122"/>
+                <a:ea typeface="等线" panose="02010600030101010101" pitchFamily="2" charset="-122"/>
+                <a:cs typeface="Courier New" panose="02070309020205020404" pitchFamily="49" charset="0"/>
               </a:rPr>
               <a:t>Nightwatch</a:t>
             </a:r>
@@ -8345,13 +8462,16 @@
                 <a:solidFill>
                   <a:schemeClr val="bg1"/>
                 </a:solidFill>
-                <a:latin typeface="Consolas" panose="020B0609020204030204" pitchFamily="49" charset="0"/>
-                <a:ea typeface="宋体" panose="02010600030101010101" pitchFamily="2" charset="-122"/>
+                <a:latin typeface="等线" panose="02010600030101010101" pitchFamily="2" charset="-122"/>
+                <a:ea typeface="等线" panose="02010600030101010101" pitchFamily="2" charset="-122"/>
+                <a:cs typeface="Courier New" panose="02070309020205020404" pitchFamily="49" charset="0"/>
               </a:rPr>
               <a:t>.js</a:t>
             </a:r>
             <a:endParaRPr lang="zh-CN" altLang="en-US">
-              <a:ea typeface="宋体" panose="02010600030101010101" pitchFamily="2" charset="-122"/>
+              <a:latin typeface="等线" panose="02010600030101010101" pitchFamily="2" charset="-122"/>
+              <a:ea typeface="等线" panose="02010600030101010101" pitchFamily="2" charset="-122"/>
+              <a:cs typeface="Courier New" panose="02070309020205020404" pitchFamily="49" charset="0"/>
             </a:endParaRPr>
           </a:p>
         </p:txBody>
@@ -8413,8 +8533,9 @@
                 <a:solidFill>
                   <a:schemeClr val="bg1"/>
                 </a:solidFill>
-                <a:latin typeface="Consolas" panose="020B0609020204030204" pitchFamily="49" charset="0"/>
-                <a:ea typeface="宋体" panose="02010600030101010101" pitchFamily="2" charset="-122"/>
+                <a:latin typeface="等线" panose="02010600030101010101" pitchFamily="2" charset="-122"/>
+                <a:ea typeface="等线" panose="02010600030101010101" pitchFamily="2" charset="-122"/>
+                <a:cs typeface="Courier New" panose="02070309020205020404" pitchFamily="49" charset="0"/>
               </a:rPr>
               <a:t>Stylus</a:t>
             </a:r>
@@ -8426,8 +8547,9 @@
                 <a:solidFill>
                   <a:schemeClr val="bg1"/>
                 </a:solidFill>
-                <a:latin typeface="Consolas" panose="020B0609020204030204" pitchFamily="49" charset="0"/>
-                <a:ea typeface="宋体" panose="02010600030101010101" pitchFamily="2" charset="-122"/>
+                <a:latin typeface="等线" panose="02010600030101010101" pitchFamily="2" charset="-122"/>
+                <a:ea typeface="等线" panose="02010600030101010101" pitchFamily="2" charset="-122"/>
+                <a:cs typeface="Courier New" panose="02070309020205020404" pitchFamily="49" charset="0"/>
               </a:rPr>
               <a:t>(</a:t>
             </a:r>
@@ -8436,8 +8558,9 @@
                 <a:solidFill>
                   <a:schemeClr val="bg1"/>
                 </a:solidFill>
-                <a:latin typeface="Consolas" panose="020B0609020204030204" pitchFamily="49" charset="0"/>
-                <a:ea typeface="宋体" panose="02010600030101010101" pitchFamily="2" charset="-122"/>
+                <a:latin typeface="等线" panose="02010600030101010101" pitchFamily="2" charset="-122"/>
+                <a:ea typeface="等线" panose="02010600030101010101" pitchFamily="2" charset="-122"/>
+                <a:cs typeface="Courier New" panose="02070309020205020404" pitchFamily="49" charset="0"/>
               </a:rPr>
               <a:t>Nib</a:t>
             </a:r>
@@ -8446,8 +8569,9 @@
                 <a:solidFill>
                   <a:schemeClr val="bg1"/>
                 </a:solidFill>
-                <a:latin typeface="Consolas" panose="020B0609020204030204" pitchFamily="49" charset="0"/>
-                <a:ea typeface="宋体" panose="02010600030101010101" pitchFamily="2" charset="-122"/>
+                <a:latin typeface="等线" panose="02010600030101010101" pitchFamily="2" charset="-122"/>
+                <a:ea typeface="等线" panose="02010600030101010101" pitchFamily="2" charset="-122"/>
+                <a:cs typeface="Courier New" panose="02070309020205020404" pitchFamily="49" charset="0"/>
               </a:rPr>
               <a:t>...)</a:t>
             </a:r>
@@ -8511,8 +8635,9 @@
                 <a:solidFill>
                   <a:schemeClr val="bg1"/>
                 </a:solidFill>
-                <a:latin typeface="Consolas" panose="020B0609020204030204" pitchFamily="49" charset="0"/>
-                <a:ea typeface="宋体" panose="02010600030101010101" pitchFamily="2" charset="-122"/>
+                <a:latin typeface="等线" panose="02010600030101010101" pitchFamily="2" charset="-122"/>
+                <a:ea typeface="等线" panose="02010600030101010101" pitchFamily="2" charset="-122"/>
+                <a:cs typeface="Courier New" panose="02070309020205020404" pitchFamily="49" charset="0"/>
               </a:rPr>
               <a:t>Gecko</a:t>
             </a:r>
@@ -8524,8 +8649,9 @@
                 <a:solidFill>
                   <a:schemeClr val="bg1"/>
                 </a:solidFill>
-                <a:latin typeface="Consolas" panose="020B0609020204030204" pitchFamily="49" charset="0"/>
-                <a:ea typeface="宋体" panose="02010600030101010101" pitchFamily="2" charset="-122"/>
+                <a:latin typeface="等线" panose="02010600030101010101" pitchFamily="2" charset="-122"/>
+                <a:ea typeface="等线" panose="02010600030101010101" pitchFamily="2" charset="-122"/>
+                <a:cs typeface="Courier New" panose="02070309020205020404" pitchFamily="49" charset="0"/>
               </a:rPr>
               <a:t>(Firefox)</a:t>
             </a:r>
@@ -8589,7 +8715,9 @@
                 <a:solidFill>
                   <a:schemeClr val="bg1"/>
                 </a:solidFill>
-                <a:latin typeface="Consolas" panose="020B0609020204030204" pitchFamily="49" charset="0"/>
+                <a:latin typeface="等线" panose="02010600030101010101" pitchFamily="2" charset="-122"/>
+                <a:ea typeface="等线" panose="02010600030101010101" pitchFamily="2" charset="-122"/>
+                <a:cs typeface="Courier New" panose="02070309020205020404" pitchFamily="49" charset="0"/>
               </a:rPr>
               <a:t>EdgeHTML</a:t>
             </a:r>
@@ -8601,7 +8729,9 @@
                 <a:solidFill>
                   <a:schemeClr val="bg1"/>
                 </a:solidFill>
-                <a:latin typeface="Consolas" panose="020B0609020204030204" pitchFamily="49" charset="0"/>
+                <a:latin typeface="等线" panose="02010600030101010101" pitchFamily="2" charset="-122"/>
+                <a:ea typeface="等线" panose="02010600030101010101" pitchFamily="2" charset="-122"/>
+                <a:cs typeface="Courier New" panose="02070309020205020404" pitchFamily="49" charset="0"/>
               </a:rPr>
               <a:t>(Edge) </a:t>
             </a:r>
@@ -8665,8 +8795,9 @@
                 <a:solidFill>
                   <a:schemeClr val="bg1"/>
                 </a:solidFill>
-                <a:latin typeface="Consolas" panose="020B0609020204030204" pitchFamily="49" charset="0"/>
-                <a:ea typeface="宋体" panose="02010600030101010101" pitchFamily="2" charset="-122"/>
+                <a:latin typeface="等线" panose="02010600030101010101" pitchFamily="2" charset="-122"/>
+                <a:ea typeface="等线" panose="02010600030101010101" pitchFamily="2" charset="-122"/>
+                <a:cs typeface="Courier New" panose="02070309020205020404" pitchFamily="49" charset="0"/>
               </a:rPr>
               <a:t>DOM, Element, Attribute</a:t>
             </a:r>
@@ -8678,8 +8809,9 @@
                 <a:solidFill>
                   <a:schemeClr val="bg1"/>
                 </a:solidFill>
-                <a:latin typeface="Consolas" panose="020B0609020204030204" pitchFamily="49" charset="0"/>
-                <a:ea typeface="宋体" panose="02010600030101010101" pitchFamily="2" charset="-122"/>
+                <a:latin typeface="等线" panose="02010600030101010101" pitchFamily="2" charset="-122"/>
+                <a:ea typeface="等线" panose="02010600030101010101" pitchFamily="2" charset="-122"/>
+                <a:cs typeface="Courier New" panose="02070309020205020404" pitchFamily="49" charset="0"/>
               </a:rPr>
               <a:t>(HTML)</a:t>
             </a:r>
@@ -8687,8 +8819,9 @@
               <a:solidFill>
                 <a:schemeClr val="bg1"/>
               </a:solidFill>
-              <a:latin typeface="Consolas" panose="020B0609020204030204" pitchFamily="49" charset="0"/>
-              <a:ea typeface="宋体" panose="02010600030101010101" pitchFamily="2" charset="-122"/>
+              <a:latin typeface="等线" panose="02010600030101010101" pitchFamily="2" charset="-122"/>
+              <a:ea typeface="等线" panose="02010600030101010101" pitchFamily="2" charset="-122"/>
+              <a:cs typeface="Courier New" panose="02070309020205020404" pitchFamily="49" charset="0"/>
             </a:endParaRPr>
           </a:p>
         </p:txBody>
@@ -8750,8 +8883,9 @@
                 <a:solidFill>
                   <a:schemeClr val="bg1"/>
                 </a:solidFill>
-                <a:latin typeface="Consolas" panose="020B0609020204030204" pitchFamily="49" charset="0"/>
-                <a:ea typeface="宋体" panose="02010600030101010101" pitchFamily="2" charset="-122"/>
+                <a:latin typeface="等线" panose="02010600030101010101" pitchFamily="2" charset="-122"/>
+                <a:ea typeface="等线" panose="02010600030101010101" pitchFamily="2" charset="-122"/>
+                <a:cs typeface="Courier New" panose="02070309020205020404" pitchFamily="49" charset="0"/>
               </a:rPr>
               <a:t>Prototype, Scope, Closure, JSON</a:t>
             </a:r>
@@ -8760,8 +8894,9 @@
                 <a:solidFill>
                   <a:schemeClr val="bg1"/>
                 </a:solidFill>
-                <a:latin typeface="Consolas" panose="020B0609020204030204" pitchFamily="49" charset="0"/>
-                <a:ea typeface="宋体" panose="02010600030101010101" pitchFamily="2" charset="-122"/>
+                <a:latin typeface="等线" panose="02010600030101010101" pitchFamily="2" charset="-122"/>
+                <a:ea typeface="等线" panose="02010600030101010101" pitchFamily="2" charset="-122"/>
+                <a:cs typeface="Courier New" panose="02070309020205020404" pitchFamily="49" charset="0"/>
               </a:rPr>
               <a:t>, JSONP, AJAX</a:t>
             </a:r>
@@ -8769,8 +8904,9 @@
               <a:solidFill>
                 <a:schemeClr val="bg1"/>
               </a:solidFill>
-              <a:latin typeface="Consolas" panose="020B0609020204030204" pitchFamily="49" charset="0"/>
-              <a:ea typeface="宋体" panose="02010600030101010101" pitchFamily="2" charset="-122"/>
+              <a:latin typeface="等线" panose="02010600030101010101" pitchFamily="2" charset="-122"/>
+              <a:ea typeface="等线" panose="02010600030101010101" pitchFamily="2" charset="-122"/>
+              <a:cs typeface="Courier New" panose="02070309020205020404" pitchFamily="49" charset="0"/>
             </a:endParaRPr>
           </a:p>
           <a:p>
@@ -8780,8 +8916,9 @@
                 <a:solidFill>
                   <a:schemeClr val="bg1"/>
                 </a:solidFill>
-                <a:latin typeface="Consolas" panose="020B0609020204030204" pitchFamily="49" charset="0"/>
-                <a:ea typeface="宋体" panose="02010600030101010101" pitchFamily="2" charset="-122"/>
+                <a:latin typeface="等线" panose="02010600030101010101" pitchFamily="2" charset="-122"/>
+                <a:ea typeface="等线" panose="02010600030101010101" pitchFamily="2" charset="-122"/>
+                <a:cs typeface="Courier New" panose="02070309020205020404" pitchFamily="49" charset="0"/>
               </a:rPr>
               <a:t>(JavaScript)</a:t>
             </a:r>
@@ -8789,8 +8926,9 @@
               <a:solidFill>
                 <a:schemeClr val="bg1"/>
               </a:solidFill>
-              <a:latin typeface="Consolas" panose="020B0609020204030204" pitchFamily="49" charset="0"/>
-              <a:ea typeface="宋体" panose="02010600030101010101" pitchFamily="2" charset="-122"/>
+              <a:latin typeface="等线" panose="02010600030101010101" pitchFamily="2" charset="-122"/>
+              <a:ea typeface="等线" panose="02010600030101010101" pitchFamily="2" charset="-122"/>
+              <a:cs typeface="Courier New" panose="02070309020205020404" pitchFamily="49" charset="0"/>
             </a:endParaRPr>
           </a:p>
         </p:txBody>
@@ -8922,8 +9060,9 @@
                 <a:solidFill>
                   <a:schemeClr val="bg1"/>
                 </a:solidFill>
-                <a:latin typeface="Consolas" panose="020B0609020204030204" pitchFamily="49" charset="0"/>
-                <a:ea typeface="宋体" panose="02010600030101010101" pitchFamily="2" charset="-122"/>
+                <a:latin typeface="等线" panose="02010600030101010101" pitchFamily="2" charset="-122"/>
+                <a:ea typeface="等线" panose="02010600030101010101" pitchFamily="2" charset="-122"/>
+                <a:cs typeface="Courier New" panose="02070309020205020404" pitchFamily="49" charset="0"/>
               </a:rPr>
               <a:t>Browser</a:t>
             </a:r>
@@ -8987,8 +9126,9 @@
                 <a:solidFill>
                   <a:schemeClr val="bg1"/>
                 </a:solidFill>
-                <a:latin typeface="Consolas" panose="020B0609020204030204" pitchFamily="49" charset="0"/>
-                <a:ea typeface="宋体" panose="02010600030101010101" pitchFamily="2" charset="-122"/>
+                <a:latin typeface="等线" panose="02010600030101010101" pitchFamily="2" charset="-122"/>
+                <a:ea typeface="等线" panose="02010600030101010101" pitchFamily="2" charset="-122"/>
+                <a:cs typeface="Courier New" panose="02070309020205020404" pitchFamily="49" charset="0"/>
               </a:rPr>
               <a:t>Internet Explorer</a:t>
             </a:r>
@@ -9052,8 +9192,9 @@
                 <a:solidFill>
                   <a:schemeClr val="bg1"/>
                 </a:solidFill>
-                <a:latin typeface="Consolas" panose="020B0609020204030204" pitchFamily="49" charset="0"/>
-                <a:ea typeface="宋体" panose="02010600030101010101" pitchFamily="2" charset="-122"/>
+                <a:latin typeface="等线" panose="02010600030101010101" pitchFamily="2" charset="-122"/>
+                <a:ea typeface="等线" panose="02010600030101010101" pitchFamily="2" charset="-122"/>
+                <a:cs typeface="Courier New" panose="02070309020205020404" pitchFamily="49" charset="0"/>
               </a:rPr>
               <a:t>Chrome</a:t>
             </a:r>
@@ -9117,8 +9258,9 @@
                 <a:solidFill>
                   <a:schemeClr val="bg1"/>
                 </a:solidFill>
-                <a:latin typeface="Consolas" panose="020B0609020204030204" pitchFamily="49" charset="0"/>
-                <a:ea typeface="宋体" panose="02010600030101010101" pitchFamily="2" charset="-122"/>
+                <a:latin typeface="等线" panose="02010600030101010101" pitchFamily="2" charset="-122"/>
+                <a:ea typeface="等线" panose="02010600030101010101" pitchFamily="2" charset="-122"/>
+                <a:cs typeface="Courier New" panose="02070309020205020404" pitchFamily="49" charset="0"/>
               </a:rPr>
               <a:t>Firefox</a:t>
             </a:r>
@@ -9182,8 +9324,9 @@
                 <a:solidFill>
                   <a:schemeClr val="bg1"/>
                 </a:solidFill>
-                <a:latin typeface="Consolas" panose="020B0609020204030204" pitchFamily="49" charset="0"/>
-                <a:ea typeface="宋体" panose="02010600030101010101" pitchFamily="2" charset="-122"/>
+                <a:latin typeface="等线" panose="02010600030101010101" pitchFamily="2" charset="-122"/>
+                <a:ea typeface="等线" panose="02010600030101010101" pitchFamily="2" charset="-122"/>
+                <a:cs typeface="Courier New" panose="02070309020205020404" pitchFamily="49" charset="0"/>
               </a:rPr>
               <a:t>Safari</a:t>
             </a:r>
@@ -9247,8 +9390,9 @@
                 <a:solidFill>
                   <a:schemeClr val="bg1"/>
                 </a:solidFill>
-                <a:latin typeface="Consolas" panose="020B0609020204030204" pitchFamily="49" charset="0"/>
-                <a:ea typeface="宋体" panose="02010600030101010101" pitchFamily="2" charset="-122"/>
+                <a:latin typeface="等线" panose="02010600030101010101" pitchFamily="2" charset="-122"/>
+                <a:ea typeface="等线" panose="02010600030101010101" pitchFamily="2" charset="-122"/>
+                <a:cs typeface="Courier New" panose="02070309020205020404" pitchFamily="49" charset="0"/>
               </a:rPr>
               <a:t>Opera</a:t>
             </a:r>
@@ -9312,8 +9456,9 @@
                 <a:solidFill>
                   <a:schemeClr val="bg1"/>
                 </a:solidFill>
-                <a:latin typeface="Consolas" panose="020B0609020204030204" pitchFamily="49" charset="0"/>
-                <a:ea typeface="宋体" panose="02010600030101010101" pitchFamily="2" charset="-122"/>
+                <a:latin typeface="等线" panose="02010600030101010101" pitchFamily="2" charset="-122"/>
+                <a:ea typeface="等线" panose="02010600030101010101" pitchFamily="2" charset="-122"/>
+                <a:cs typeface="Courier New" panose="02070309020205020404" pitchFamily="49" charset="0"/>
               </a:rPr>
               <a:t>Edge</a:t>
             </a:r>
@@ -9377,8 +9522,9 @@
                 <a:solidFill>
                   <a:schemeClr val="bg1"/>
                 </a:solidFill>
-                <a:latin typeface="Consolas" panose="020B0609020204030204" pitchFamily="49" charset="0"/>
-                <a:ea typeface="宋体" panose="02010600030101010101" pitchFamily="2" charset="-122"/>
+                <a:latin typeface="等线" panose="02010600030101010101" pitchFamily="2" charset="-122"/>
+                <a:ea typeface="等线" panose="02010600030101010101" pitchFamily="2" charset="-122"/>
+                <a:cs typeface="Courier New" panose="02070309020205020404" pitchFamily="49" charset="0"/>
               </a:rPr>
               <a:t>Netscape ;-)</a:t>
             </a:r>
@@ -9448,8 +9594,9 @@
                 <a:solidFill>
                   <a:schemeClr val="bg1"/>
                 </a:solidFill>
-                <a:latin typeface="Consolas" panose="020B0609020204030204" pitchFamily="49" charset="0"/>
-                <a:ea typeface="宋体" panose="02010600030101010101" pitchFamily="2" charset="-122"/>
+                <a:latin typeface="等线" panose="02010600030101010101" pitchFamily="2" charset="-122"/>
+                <a:ea typeface="等线" panose="02010600030101010101" pitchFamily="2" charset="-122"/>
+                <a:cs typeface="Courier New" panose="02070309020205020404" pitchFamily="49" charset="0"/>
               </a:rPr>
               <a:t>JavaScript</a:t>
             </a:r>
@@ -9461,8 +9608,9 @@
                 <a:solidFill>
                   <a:schemeClr val="bg1"/>
                 </a:solidFill>
-                <a:latin typeface="Consolas" panose="020B0609020204030204" pitchFamily="49" charset="0"/>
-                <a:ea typeface="宋体" panose="02010600030101010101" pitchFamily="2" charset="-122"/>
+                <a:latin typeface="等线" panose="02010600030101010101" pitchFamily="2" charset="-122"/>
+                <a:ea typeface="等线" panose="02010600030101010101" pitchFamily="2" charset="-122"/>
+                <a:cs typeface="Courier New" panose="02070309020205020404" pitchFamily="49" charset="0"/>
               </a:rPr>
               <a:t>Engine</a:t>
             </a:r>
@@ -9471,8 +9619,9 @@
                 <a:solidFill>
                   <a:schemeClr val="bg1"/>
                 </a:solidFill>
-                <a:latin typeface="Consolas" panose="020B0609020204030204" pitchFamily="49" charset="0"/>
-                <a:ea typeface="宋体" panose="02010600030101010101" pitchFamily="2" charset="-122"/>
+                <a:latin typeface="等线" panose="02010600030101010101" pitchFamily="2" charset="-122"/>
+                <a:ea typeface="等线" panose="02010600030101010101" pitchFamily="2" charset="-122"/>
+                <a:cs typeface="Courier New" panose="02070309020205020404" pitchFamily="49" charset="0"/>
               </a:rPr>
               <a:t>s</a:t>
             </a:r>
@@ -9480,8 +9629,9 @@
               <a:solidFill>
                 <a:schemeClr val="bg1"/>
               </a:solidFill>
-              <a:latin typeface="Consolas" panose="020B0609020204030204" pitchFamily="49" charset="0"/>
-              <a:ea typeface="宋体" panose="02010600030101010101" pitchFamily="2" charset="-122"/>
+              <a:latin typeface="等线" panose="02010600030101010101" pitchFamily="2" charset="-122"/>
+              <a:ea typeface="等线" panose="02010600030101010101" pitchFamily="2" charset="-122"/>
+              <a:cs typeface="Courier New" panose="02070309020205020404" pitchFamily="49" charset="0"/>
             </a:endParaRPr>
           </a:p>
         </p:txBody>
@@ -9543,8 +9693,9 @@
                 <a:solidFill>
                   <a:schemeClr val="bg1"/>
                 </a:solidFill>
-                <a:latin typeface="Consolas" panose="020B0609020204030204" pitchFamily="49" charset="0"/>
-                <a:ea typeface="宋体" panose="02010600030101010101" pitchFamily="2" charset="-122"/>
+                <a:latin typeface="等线" panose="02010600030101010101" pitchFamily="2" charset="-122"/>
+                <a:ea typeface="等线" panose="02010600030101010101" pitchFamily="2" charset="-122"/>
+                <a:cs typeface="Courier New" panose="02070309020205020404" pitchFamily="49" charset="0"/>
               </a:rPr>
               <a:t>Chakra </a:t>
             </a:r>
@@ -9553,8 +9704,9 @@
                 <a:solidFill>
                   <a:schemeClr val="bg1"/>
                 </a:solidFill>
-                <a:latin typeface="Consolas" panose="020B0609020204030204" pitchFamily="49" charset="0"/>
-                <a:ea typeface="宋体" panose="02010600030101010101" pitchFamily="2" charset="-122"/>
+                <a:latin typeface="等线" panose="02010600030101010101" pitchFamily="2" charset="-122"/>
+                <a:ea typeface="等线" panose="02010600030101010101" pitchFamily="2" charset="-122"/>
+                <a:cs typeface="Courier New" panose="02070309020205020404" pitchFamily="49" charset="0"/>
               </a:rPr>
             </a:br>
             <a:r>
@@ -9562,8 +9714,9 @@
                 <a:solidFill>
                   <a:schemeClr val="bg1"/>
                 </a:solidFill>
-                <a:latin typeface="Consolas" panose="020B0609020204030204" pitchFamily="49" charset="0"/>
-                <a:ea typeface="宋体" panose="02010600030101010101" pitchFamily="2" charset="-122"/>
+                <a:latin typeface="等线" panose="02010600030101010101" pitchFamily="2" charset="-122"/>
+                <a:ea typeface="等线" panose="02010600030101010101" pitchFamily="2" charset="-122"/>
+                <a:cs typeface="Courier New" panose="02070309020205020404" pitchFamily="49" charset="0"/>
               </a:rPr>
               <a:t>(IE)</a:t>
             </a:r>
@@ -9627,8 +9780,9 @@
                 <a:solidFill>
                   <a:schemeClr val="bg1"/>
                 </a:solidFill>
-                <a:latin typeface="Consolas" panose="020B0609020204030204" pitchFamily="49" charset="0"/>
-                <a:ea typeface="宋体" panose="02010600030101010101" pitchFamily="2" charset="-122"/>
+                <a:latin typeface="等线" panose="02010600030101010101" pitchFamily="2" charset="-122"/>
+                <a:ea typeface="等线" panose="02010600030101010101" pitchFamily="2" charset="-122"/>
+                <a:cs typeface="Courier New" panose="02070309020205020404" pitchFamily="49" charset="0"/>
               </a:rPr>
               <a:t>V8 </a:t>
             </a:r>
@@ -9640,8 +9794,9 @@
                 <a:solidFill>
                   <a:schemeClr val="bg1"/>
                 </a:solidFill>
-                <a:latin typeface="Consolas" panose="020B0609020204030204" pitchFamily="49" charset="0"/>
-                <a:ea typeface="宋体" panose="02010600030101010101" pitchFamily="2" charset="-122"/>
+                <a:latin typeface="等线" panose="02010600030101010101" pitchFamily="2" charset="-122"/>
+                <a:ea typeface="等线" panose="02010600030101010101" pitchFamily="2" charset="-122"/>
+                <a:cs typeface="Courier New" panose="02070309020205020404" pitchFamily="49" charset="0"/>
               </a:rPr>
               <a:t>(Chrome)</a:t>
             </a:r>
@@ -9705,8 +9860,9 @@
                 <a:solidFill>
                   <a:schemeClr val="bg1"/>
                 </a:solidFill>
-                <a:latin typeface="Consolas" panose="020B0609020204030204" pitchFamily="49" charset="0"/>
-                <a:ea typeface="宋体" panose="02010600030101010101" pitchFamily="2" charset="-122"/>
+                <a:latin typeface="等线" panose="02010600030101010101" pitchFamily="2" charset="-122"/>
+                <a:ea typeface="等线" panose="02010600030101010101" pitchFamily="2" charset="-122"/>
+                <a:cs typeface="Courier New" panose="02070309020205020404" pitchFamily="49" charset="0"/>
               </a:rPr>
               <a:t>Nitro </a:t>
             </a:r>
@@ -9718,8 +9874,9 @@
                 <a:solidFill>
                   <a:schemeClr val="bg1"/>
                 </a:solidFill>
-                <a:latin typeface="Consolas" panose="020B0609020204030204" pitchFamily="49" charset="0"/>
-                <a:ea typeface="宋体" panose="02010600030101010101" pitchFamily="2" charset="-122"/>
+                <a:latin typeface="等线" panose="02010600030101010101" pitchFamily="2" charset="-122"/>
+                <a:ea typeface="等线" panose="02010600030101010101" pitchFamily="2" charset="-122"/>
+                <a:cs typeface="Courier New" panose="02070309020205020404" pitchFamily="49" charset="0"/>
               </a:rPr>
               <a:t>(Safari)</a:t>
             </a:r>
@@ -9783,8 +9940,9 @@
                 <a:solidFill>
                   <a:schemeClr val="bg1"/>
                 </a:solidFill>
-                <a:latin typeface="Consolas" panose="020B0609020204030204" pitchFamily="49" charset="0"/>
-                <a:ea typeface="宋体" panose="02010600030101010101" pitchFamily="2" charset="-122"/>
+                <a:latin typeface="等线" panose="02010600030101010101" pitchFamily="2" charset="-122"/>
+                <a:ea typeface="等线" panose="02010600030101010101" pitchFamily="2" charset="-122"/>
+                <a:cs typeface="Courier New" panose="02070309020205020404" pitchFamily="49" charset="0"/>
               </a:rPr>
               <a:t>V8</a:t>
             </a:r>
@@ -9796,8 +9954,9 @@
                 <a:solidFill>
                   <a:schemeClr val="bg1"/>
                 </a:solidFill>
-                <a:latin typeface="Consolas" panose="020B0609020204030204" pitchFamily="49" charset="0"/>
-                <a:ea typeface="宋体" panose="02010600030101010101" pitchFamily="2" charset="-122"/>
+                <a:latin typeface="等线" panose="02010600030101010101" pitchFamily="2" charset="-122"/>
+                <a:ea typeface="等线" panose="02010600030101010101" pitchFamily="2" charset="-122"/>
+                <a:cs typeface="Courier New" panose="02070309020205020404" pitchFamily="49" charset="0"/>
               </a:rPr>
               <a:t>(Opera)</a:t>
             </a:r>
@@ -9861,8 +10020,9 @@
                 <a:solidFill>
                   <a:schemeClr val="bg1"/>
                 </a:solidFill>
-                <a:latin typeface="Consolas" panose="020B0609020204030204" pitchFamily="49" charset="0"/>
-                <a:ea typeface="宋体" panose="02010600030101010101" pitchFamily="2" charset="-122"/>
+                <a:latin typeface="等线" panose="02010600030101010101" pitchFamily="2" charset="-122"/>
+                <a:ea typeface="等线" panose="02010600030101010101" pitchFamily="2" charset="-122"/>
+                <a:cs typeface="Courier New" panose="02070309020205020404" pitchFamily="49" charset="0"/>
               </a:rPr>
               <a:t>SpiderMonkey </a:t>
             </a:r>
@@ -9874,8 +10034,9 @@
                 <a:solidFill>
                   <a:schemeClr val="bg1"/>
                 </a:solidFill>
-                <a:latin typeface="Consolas" panose="020B0609020204030204" pitchFamily="49" charset="0"/>
-                <a:ea typeface="宋体" panose="02010600030101010101" pitchFamily="2" charset="-122"/>
+                <a:latin typeface="等线" panose="02010600030101010101" pitchFamily="2" charset="-122"/>
+                <a:ea typeface="等线" panose="02010600030101010101" pitchFamily="2" charset="-122"/>
+                <a:cs typeface="Courier New" panose="02070309020205020404" pitchFamily="49" charset="0"/>
               </a:rPr>
               <a:t>(Firefox)</a:t>
             </a:r>
@@ -9939,7 +10100,9 @@
                 <a:solidFill>
                   <a:schemeClr val="bg1"/>
                 </a:solidFill>
-                <a:latin typeface="Consolas" panose="020B0609020204030204" pitchFamily="49" charset="0"/>
+                <a:latin typeface="等线" panose="02010600030101010101" pitchFamily="2" charset="-122"/>
+                <a:ea typeface="等线" panose="02010600030101010101" pitchFamily="2" charset="-122"/>
+                <a:cs typeface="Courier New" panose="02070309020205020404" pitchFamily="49" charset="0"/>
               </a:rPr>
               <a:t>Chakra</a:t>
             </a:r>
@@ -9951,7 +10114,9 @@
                 <a:solidFill>
                   <a:schemeClr val="bg1"/>
                 </a:solidFill>
-                <a:latin typeface="Consolas" panose="020B0609020204030204" pitchFamily="49" charset="0"/>
+                <a:latin typeface="等线" panose="02010600030101010101" pitchFamily="2" charset="-122"/>
+                <a:ea typeface="等线" panose="02010600030101010101" pitchFamily="2" charset="-122"/>
+                <a:cs typeface="Courier New" panose="02070309020205020404" pitchFamily="49" charset="0"/>
               </a:rPr>
               <a:t>(Edge)</a:t>
             </a:r>
@@ -10015,8 +10180,9 @@
                 <a:solidFill>
                   <a:schemeClr val="bg1"/>
                 </a:solidFill>
-                <a:latin typeface="Consolas" panose="020B0609020204030204" pitchFamily="49" charset="0"/>
-                <a:ea typeface="宋体" panose="02010600030101010101" pitchFamily="2" charset="-122"/>
+                <a:latin typeface="等线" panose="02010600030101010101" pitchFamily="2" charset="-122"/>
+                <a:ea typeface="等线" panose="02010600030101010101" pitchFamily="2" charset="-122"/>
+                <a:cs typeface="Courier New" panose="02070309020205020404" pitchFamily="49" charset="0"/>
               </a:rPr>
               <a:t>Image Optimization</a:t>
             </a:r>
@@ -10080,8 +10246,9 @@
                 <a:solidFill>
                   <a:schemeClr val="bg1"/>
                 </a:solidFill>
-                <a:latin typeface="Consolas" panose="020B0609020204030204" pitchFamily="49" charset="0"/>
-                <a:ea typeface="宋体" panose="02010600030101010101" pitchFamily="2" charset="-122"/>
+                <a:latin typeface="等线" panose="02010600030101010101" pitchFamily="2" charset="-122"/>
+                <a:ea typeface="等线" panose="02010600030101010101" pitchFamily="2" charset="-122"/>
+                <a:cs typeface="Courier New" panose="02070309020205020404" pitchFamily="49" charset="0"/>
               </a:rPr>
               <a:t>Unit Testing</a:t>
             </a:r>
@@ -10145,8 +10312,9 @@
                 <a:solidFill>
                   <a:schemeClr val="bg1"/>
                 </a:solidFill>
-                <a:latin typeface="Consolas" panose="020B0609020204030204" pitchFamily="49" charset="0"/>
-                <a:ea typeface="宋体" panose="02010600030101010101" pitchFamily="2" charset="-122"/>
+                <a:latin typeface="等线" panose="02010600030101010101" pitchFamily="2" charset="-122"/>
+                <a:ea typeface="等线" panose="02010600030101010101" pitchFamily="2" charset="-122"/>
+                <a:cs typeface="Courier New" panose="02070309020205020404" pitchFamily="49" charset="0"/>
               </a:rPr>
               <a:t>Broccoli</a:t>
             </a:r>
@@ -10210,8 +10378,9 @@
                 <a:solidFill>
                   <a:schemeClr val="bg1"/>
                 </a:solidFill>
-                <a:latin typeface="Consolas" panose="020B0609020204030204" pitchFamily="49" charset="0"/>
-                <a:ea typeface="宋体" panose="02010600030101010101" pitchFamily="2" charset="-122"/>
+                <a:latin typeface="等线" panose="02010600030101010101" pitchFamily="2" charset="-122"/>
+                <a:ea typeface="等线" panose="02010600030101010101" pitchFamily="2" charset="-122"/>
+                <a:cs typeface="Courier New" panose="02070309020205020404" pitchFamily="49" charset="0"/>
               </a:rPr>
               <a:t>webpack</a:t>
             </a:r>
@@ -10275,13 +10444,16 @@
                 <a:solidFill>
                   <a:schemeClr val="bg1"/>
                 </a:solidFill>
-                <a:latin typeface="Consolas" panose="020B0609020204030204" pitchFamily="49" charset="0"/>
-                <a:ea typeface="宋体" panose="02010600030101010101" pitchFamily="2" charset="-122"/>
+                <a:latin typeface="等线" panose="02010600030101010101" pitchFamily="2" charset="-122"/>
+                <a:ea typeface="等线" panose="02010600030101010101" pitchFamily="2" charset="-122"/>
+                <a:cs typeface="Courier New" panose="02070309020205020404" pitchFamily="49" charset="0"/>
               </a:rPr>
               <a:t>browserify </a:t>
             </a:r>
             <a:endParaRPr lang="zh-CN" altLang="en-US">
-              <a:ea typeface="宋体" panose="02010600030101010101" pitchFamily="2" charset="-122"/>
+              <a:latin typeface="等线" panose="02010600030101010101" pitchFamily="2" charset="-122"/>
+              <a:ea typeface="等线" panose="02010600030101010101" pitchFamily="2" charset="-122"/>
+              <a:cs typeface="Courier New" panose="02070309020205020404" pitchFamily="49" charset="0"/>
             </a:endParaRPr>
           </a:p>
         </p:txBody>
@@ -10349,8 +10521,9 @@
                 <a:solidFill>
                   <a:schemeClr val="bg1"/>
                 </a:solidFill>
-                <a:latin typeface="Consolas" panose="020B0609020204030204" pitchFamily="49" charset="0"/>
-                <a:ea typeface="宋体" panose="02010600030101010101" pitchFamily="2" charset="-122"/>
+                <a:latin typeface="等线" panose="02010600030101010101" pitchFamily="2" charset="-122"/>
+                <a:ea typeface="等线" panose="02010600030101010101" pitchFamily="2" charset="-122"/>
+                <a:cs typeface="Courier New" panose="02070309020205020404" pitchFamily="49" charset="0"/>
               </a:rPr>
               <a:t>Debug</a:t>
             </a:r>
@@ -10414,8 +10587,9 @@
                 <a:solidFill>
                   <a:schemeClr val="bg1"/>
                 </a:solidFill>
-                <a:latin typeface="Consolas" panose="020B0609020204030204" pitchFamily="49" charset="0"/>
-                <a:ea typeface="宋体" panose="02010600030101010101" pitchFamily="2" charset="-122"/>
+                <a:latin typeface="等线" panose="02010600030101010101" pitchFamily="2" charset="-122"/>
+                <a:ea typeface="等线" panose="02010600030101010101" pitchFamily="2" charset="-122"/>
+                <a:cs typeface="Courier New" panose="02070309020205020404" pitchFamily="49" charset="0"/>
               </a:rPr>
               <a:t>Developer Tools</a:t>
             </a:r>
@@ -10479,8 +10653,9 @@
                 <a:solidFill>
                   <a:schemeClr val="bg1"/>
                 </a:solidFill>
-                <a:latin typeface="Consolas" panose="020B0609020204030204" pitchFamily="49" charset="0"/>
-                <a:ea typeface="宋体" panose="02010600030101010101" pitchFamily="2" charset="-122"/>
+                <a:latin typeface="等线" panose="02010600030101010101" pitchFamily="2" charset="-122"/>
+                <a:ea typeface="等线" panose="02010600030101010101" pitchFamily="2" charset="-122"/>
+                <a:cs typeface="Courier New" panose="02070309020205020404" pitchFamily="49" charset="0"/>
               </a:rPr>
               <a:t>Firebug</a:t>
             </a:r>
@@ -10550,8 +10725,9 @@
                 <a:solidFill>
                   <a:schemeClr val="bg1"/>
                 </a:solidFill>
-                <a:latin typeface="Consolas" panose="020B0609020204030204" pitchFamily="49" charset="0"/>
-                <a:ea typeface="宋体" panose="02010600030101010101" pitchFamily="2" charset="-122"/>
+                <a:latin typeface="等线" panose="02010600030101010101" pitchFamily="2" charset="-122"/>
+                <a:ea typeface="等线" panose="02010600030101010101" pitchFamily="2" charset="-122"/>
+                <a:cs typeface="Courier New" panose="02070309020205020404" pitchFamily="49" charset="0"/>
               </a:rPr>
               <a:t>Quality</a:t>
             </a:r>
@@ -10615,8 +10791,9 @@
                 <a:solidFill>
                   <a:schemeClr val="bg1"/>
                 </a:solidFill>
-                <a:latin typeface="Consolas" panose="020B0609020204030204" pitchFamily="49" charset="0"/>
-                <a:ea typeface="宋体" panose="02010600030101010101" pitchFamily="2" charset="-122"/>
+                <a:latin typeface="等线" panose="02010600030101010101" pitchFamily="2" charset="-122"/>
+                <a:ea typeface="等线" panose="02010600030101010101" pitchFamily="2" charset="-122"/>
+                <a:cs typeface="Courier New" panose="02070309020205020404" pitchFamily="49" charset="0"/>
               </a:rPr>
               <a:t>JSLint</a:t>
             </a:r>
@@ -10680,8 +10857,9 @@
                 <a:solidFill>
                   <a:schemeClr val="bg1"/>
                 </a:solidFill>
-                <a:latin typeface="Consolas" panose="020B0609020204030204" pitchFamily="49" charset="0"/>
-                <a:ea typeface="宋体" panose="02010600030101010101" pitchFamily="2" charset="-122"/>
+                <a:latin typeface="等线" panose="02010600030101010101" pitchFamily="2" charset="-122"/>
+                <a:ea typeface="等线" panose="02010600030101010101" pitchFamily="2" charset="-122"/>
+                <a:cs typeface="Courier New" panose="02070309020205020404" pitchFamily="49" charset="0"/>
               </a:rPr>
               <a:t>JSHint</a:t>
             </a:r>
@@ -10745,8 +10923,9 @@
                 <a:solidFill>
                   <a:schemeClr val="bg1"/>
                 </a:solidFill>
-                <a:latin typeface="Consolas" panose="020B0609020204030204" pitchFamily="49" charset="0"/>
-                <a:ea typeface="宋体" panose="02010600030101010101" pitchFamily="2" charset="-122"/>
+                <a:latin typeface="等线" panose="02010600030101010101" pitchFamily="2" charset="-122"/>
+                <a:ea typeface="等线" panose="02010600030101010101" pitchFamily="2" charset="-122"/>
+                <a:cs typeface="Courier New" panose="02070309020205020404" pitchFamily="49" charset="0"/>
               </a:rPr>
               <a:t>jscs</a:t>
             </a:r>
@@ -10810,8 +10989,9 @@
                 <a:solidFill>
                   <a:schemeClr val="bg1"/>
                 </a:solidFill>
-                <a:latin typeface="Consolas" panose="020B0609020204030204" pitchFamily="49" charset="0"/>
-                <a:ea typeface="宋体" panose="02010600030101010101" pitchFamily="2" charset="-122"/>
+                <a:latin typeface="等线" panose="02010600030101010101" pitchFamily="2" charset="-122"/>
+                <a:ea typeface="等线" panose="02010600030101010101" pitchFamily="2" charset="-122"/>
+                <a:cs typeface="Courier New" panose="02070309020205020404" pitchFamily="49" charset="0"/>
               </a:rPr>
               <a:t>Closure Linter</a:t>
             </a:r>
@@ -10875,8 +11055,9 @@
                 <a:solidFill>
                   <a:schemeClr val="bg1"/>
                 </a:solidFill>
-                <a:latin typeface="Consolas" panose="020B0609020204030204" pitchFamily="49" charset="0"/>
-                <a:ea typeface="宋体" panose="02010600030101010101" pitchFamily="2" charset="-122"/>
+                <a:latin typeface="等线" panose="02010600030101010101" pitchFamily="2" charset="-122"/>
+                <a:ea typeface="等线" panose="02010600030101010101" pitchFamily="2" charset="-122"/>
+                <a:cs typeface="Courier New" panose="02070309020205020404" pitchFamily="49" charset="0"/>
               </a:rPr>
               <a:t>SonarQube </a:t>
             </a:r>
@@ -10940,8 +11121,9 @@
                 <a:solidFill>
                   <a:schemeClr val="bg1"/>
                 </a:solidFill>
-                <a:latin typeface="Consolas" panose="020B0609020204030204" pitchFamily="49" charset="0"/>
-                <a:ea typeface="宋体" panose="02010600030101010101" pitchFamily="2" charset="-122"/>
+                <a:latin typeface="等线" panose="02010600030101010101" pitchFamily="2" charset="-122"/>
+                <a:ea typeface="等线" panose="02010600030101010101" pitchFamily="2" charset="-122"/>
+                <a:cs typeface="Courier New" panose="02070309020205020404" pitchFamily="49" charset="0"/>
               </a:rPr>
               <a:t>Phantom.js</a:t>
             </a:r>
@@ -11005,8 +11187,9 @@
                 <a:solidFill>
                   <a:schemeClr val="bg1"/>
                 </a:solidFill>
-                <a:latin typeface="Consolas" panose="020B0609020204030204" pitchFamily="49" charset="0"/>
-                <a:ea typeface="宋体" panose="02010600030101010101" pitchFamily="2" charset="-122"/>
+                <a:latin typeface="等线" panose="02010600030101010101" pitchFamily="2" charset="-122"/>
+                <a:ea typeface="等线" panose="02010600030101010101" pitchFamily="2" charset="-122"/>
+                <a:cs typeface="Courier New" panose="02070309020205020404" pitchFamily="49" charset="0"/>
               </a:rPr>
               <a:t>Selenium</a:t>
             </a:r>
@@ -11070,8 +11253,9 @@
                 <a:solidFill>
                   <a:schemeClr val="bg1"/>
                 </a:solidFill>
-                <a:latin typeface="Consolas" panose="020B0609020204030204" pitchFamily="49" charset="0"/>
-                <a:ea typeface="宋体" panose="02010600030101010101" pitchFamily="2" charset="-122"/>
+                <a:latin typeface="等线" panose="02010600030101010101" pitchFamily="2" charset="-122"/>
+                <a:ea typeface="等线" panose="02010600030101010101" pitchFamily="2" charset="-122"/>
+                <a:cs typeface="Courier New" panose="02070309020205020404" pitchFamily="49" charset="0"/>
               </a:rPr>
               <a:t>Chai</a:t>
             </a:r>
@@ -11135,8 +11319,9 @@
                 <a:solidFill>
                   <a:schemeClr val="bg1"/>
                 </a:solidFill>
-                <a:latin typeface="Consolas" panose="020B0609020204030204" pitchFamily="49" charset="0"/>
-                <a:ea typeface="宋体" panose="02010600030101010101" pitchFamily="2" charset="-122"/>
+                <a:latin typeface="等线" panose="02010600030101010101" pitchFamily="2" charset="-122"/>
+                <a:ea typeface="等线" panose="02010600030101010101" pitchFamily="2" charset="-122"/>
+                <a:cs typeface="Courier New" panose="02070309020205020404" pitchFamily="49" charset="0"/>
               </a:rPr>
               <a:t>Karma </a:t>
             </a:r>
@@ -11200,8 +11385,9 @@
                 <a:solidFill>
                   <a:schemeClr val="bg1"/>
                 </a:solidFill>
-                <a:latin typeface="Consolas" panose="020B0609020204030204" pitchFamily="49" charset="0"/>
-                <a:ea typeface="宋体" panose="02010600030101010101" pitchFamily="2" charset="-122"/>
+                <a:latin typeface="等线" panose="02010600030101010101" pitchFamily="2" charset="-122"/>
+                <a:ea typeface="等线" panose="02010600030101010101" pitchFamily="2" charset="-122"/>
+                <a:cs typeface="Courier New" panose="02070309020205020404" pitchFamily="49" charset="0"/>
               </a:rPr>
               <a:t>Sinon</a:t>
             </a:r>
@@ -11210,8 +11396,9 @@
                 <a:solidFill>
                   <a:schemeClr val="bg1"/>
                 </a:solidFill>
-                <a:latin typeface="Consolas" panose="020B0609020204030204" pitchFamily="49" charset="0"/>
-                <a:ea typeface="宋体" panose="02010600030101010101" pitchFamily="2" charset="-122"/>
+                <a:latin typeface="等线" panose="02010600030101010101" pitchFamily="2" charset="-122"/>
+                <a:ea typeface="等线" panose="02010600030101010101" pitchFamily="2" charset="-122"/>
+                <a:cs typeface="Courier New" panose="02070309020205020404" pitchFamily="49" charset="0"/>
               </a:rPr>
               <a:t>.JS</a:t>
             </a:r>
@@ -11219,8 +11406,9 @@
               <a:solidFill>
                 <a:schemeClr val="bg1"/>
               </a:solidFill>
-              <a:latin typeface="Consolas" panose="020B0609020204030204" pitchFamily="49" charset="0"/>
-              <a:ea typeface="宋体" panose="02010600030101010101" pitchFamily="2" charset="-122"/>
+              <a:latin typeface="等线" panose="02010600030101010101" pitchFamily="2" charset="-122"/>
+              <a:ea typeface="等线" panose="02010600030101010101" pitchFamily="2" charset="-122"/>
+              <a:cs typeface="Courier New" panose="02070309020205020404" pitchFamily="49" charset="0"/>
             </a:endParaRPr>
           </a:p>
         </p:txBody>
@@ -11282,8 +11470,9 @@
                 <a:solidFill>
                   <a:schemeClr val="bg1"/>
                 </a:solidFill>
-                <a:latin typeface="Consolas" panose="020B0609020204030204" pitchFamily="49" charset="0"/>
-                <a:ea typeface="宋体" panose="02010600030101010101" pitchFamily="2" charset="-122"/>
+                <a:latin typeface="等线" panose="02010600030101010101" pitchFamily="2" charset="-122"/>
+                <a:ea typeface="等线" panose="02010600030101010101" pitchFamily="2" charset="-122"/>
+                <a:cs typeface="Courier New" panose="02070309020205020404" pitchFamily="49" charset="0"/>
               </a:rPr>
               <a:t>Underscore</a:t>
             </a:r>
@@ -11347,8 +11536,9 @@
                 <a:solidFill>
                   <a:schemeClr val="bg1"/>
                 </a:solidFill>
-                <a:latin typeface="Consolas" panose="020B0609020204030204" pitchFamily="49" charset="0"/>
-                <a:ea typeface="宋体" panose="02010600030101010101" pitchFamily="2" charset="-122"/>
+                <a:latin typeface="等线" panose="02010600030101010101" pitchFamily="2" charset="-122"/>
+                <a:ea typeface="等线" panose="02010600030101010101" pitchFamily="2" charset="-122"/>
+                <a:cs typeface="Courier New" panose="02070309020205020404" pitchFamily="49" charset="0"/>
               </a:rPr>
               <a:t>RequireJS</a:t>
             </a:r>
@@ -11412,8 +11602,9 @@
                 <a:solidFill>
                   <a:schemeClr val="bg1"/>
                 </a:solidFill>
-                <a:latin typeface="Consolas" panose="020B0609020204030204" pitchFamily="49" charset="0"/>
-                <a:ea typeface="宋体" panose="02010600030101010101" pitchFamily="2" charset="-122"/>
+                <a:latin typeface="等线" panose="02010600030101010101" pitchFamily="2" charset="-122"/>
+                <a:ea typeface="等线" panose="02010600030101010101" pitchFamily="2" charset="-122"/>
+                <a:cs typeface="Courier New" panose="02070309020205020404" pitchFamily="49" charset="0"/>
               </a:rPr>
               <a:t>Dojo</a:t>
             </a:r>
@@ -11477,8 +11668,9 @@
                 <a:solidFill>
                   <a:schemeClr val="bg1"/>
                 </a:solidFill>
-                <a:latin typeface="Consolas" panose="020B0609020204030204" pitchFamily="49" charset="0"/>
-                <a:ea typeface="宋体" panose="02010600030101010101" pitchFamily="2" charset="-122"/>
+                <a:latin typeface="等线" panose="02010600030101010101" pitchFamily="2" charset="-122"/>
+                <a:ea typeface="等线" panose="02010600030101010101" pitchFamily="2" charset="-122"/>
+                <a:cs typeface="Courier New" panose="02070309020205020404" pitchFamily="49" charset="0"/>
               </a:rPr>
               <a:t>Deft.js</a:t>
             </a:r>
@@ -11548,7 +11740,9 @@
                 <a:solidFill>
                   <a:schemeClr val="bg1"/>
                 </a:solidFill>
-                <a:latin typeface="Consolas" panose="020B0609020204030204" pitchFamily="49" charset="0"/>
+                <a:latin typeface="等线" panose="02010600030101010101" pitchFamily="2" charset="-122"/>
+                <a:ea typeface="等线" panose="02010600030101010101" pitchFamily="2" charset="-122"/>
+                <a:cs typeface="Courier New" panose="02070309020205020404" pitchFamily="49" charset="0"/>
               </a:rPr>
               <a:t>UI frameworks</a:t>
             </a:r>
@@ -11612,8 +11806,9 @@
                 <a:solidFill>
                   <a:schemeClr val="bg1"/>
                 </a:solidFill>
-                <a:latin typeface="Consolas" panose="020B0609020204030204" pitchFamily="49" charset="0"/>
-                <a:ea typeface="宋体" panose="02010600030101010101" pitchFamily="2" charset="-122"/>
+                <a:latin typeface="等线" panose="02010600030101010101" pitchFamily="2" charset="-122"/>
+                <a:ea typeface="等线" panose="02010600030101010101" pitchFamily="2" charset="-122"/>
+                <a:cs typeface="Courier New" panose="02070309020205020404" pitchFamily="49" charset="0"/>
               </a:rPr>
               <a:t>Semantic UI</a:t>
             </a:r>
@@ -11677,8 +11872,9 @@
                 <a:solidFill>
                   <a:schemeClr val="bg1"/>
                 </a:solidFill>
-                <a:latin typeface="Consolas" panose="020B0609020204030204" pitchFamily="49" charset="0"/>
-                <a:ea typeface="宋体" panose="02010600030101010101" pitchFamily="2" charset="-122"/>
+                <a:latin typeface="等线" panose="02010600030101010101" pitchFamily="2" charset="-122"/>
+                <a:ea typeface="等线" panose="02010600030101010101" pitchFamily="2" charset="-122"/>
+                <a:cs typeface="Courier New" panose="02070309020205020404" pitchFamily="49" charset="0"/>
               </a:rPr>
               <a:t>Bootstrap</a:t>
             </a:r>
@@ -11742,8 +11938,9 @@
                 <a:solidFill>
                   <a:schemeClr val="bg1"/>
                 </a:solidFill>
-                <a:latin typeface="Consolas" panose="020B0609020204030204" pitchFamily="49" charset="0"/>
-                <a:ea typeface="宋体" panose="02010600030101010101" pitchFamily="2" charset="-122"/>
+                <a:latin typeface="等线" panose="02010600030101010101" pitchFamily="2" charset="-122"/>
+                <a:ea typeface="等线" panose="02010600030101010101" pitchFamily="2" charset="-122"/>
+                <a:cs typeface="Courier New" panose="02070309020205020404" pitchFamily="49" charset="0"/>
               </a:rPr>
               <a:t>ZURB</a:t>
             </a:r>
@@ -11807,8 +12004,9 @@
                 <a:solidFill>
                   <a:schemeClr val="bg1"/>
                 </a:solidFill>
-                <a:latin typeface="Consolas" panose="020B0609020204030204" pitchFamily="49" charset="0"/>
-                <a:ea typeface="宋体" panose="02010600030101010101" pitchFamily="2" charset="-122"/>
+                <a:latin typeface="等线" panose="02010600030101010101" pitchFamily="2" charset="-122"/>
+                <a:ea typeface="等线" panose="02010600030101010101" pitchFamily="2" charset="-122"/>
+                <a:cs typeface="Courier New" panose="02070309020205020404" pitchFamily="49" charset="0"/>
               </a:rPr>
               <a:t>YUI</a:t>
             </a:r>
@@ -11872,8 +12070,9 @@
                 <a:solidFill>
                   <a:schemeClr val="bg1"/>
                 </a:solidFill>
-                <a:latin typeface="Consolas" panose="020B0609020204030204" pitchFamily="49" charset="0"/>
-                <a:ea typeface="宋体" panose="02010600030101010101" pitchFamily="2" charset="-122"/>
+                <a:latin typeface="等线" panose="02010600030101010101" pitchFamily="2" charset="-122"/>
+                <a:ea typeface="等线" panose="02010600030101010101" pitchFamily="2" charset="-122"/>
+                <a:cs typeface="Courier New" panose="02070309020205020404" pitchFamily="49" charset="0"/>
               </a:rPr>
               <a:t>Responsive</a:t>
             </a:r>
@@ -11885,8 +12084,9 @@
                 <a:solidFill>
                   <a:schemeClr val="bg1"/>
                 </a:solidFill>
-                <a:latin typeface="Consolas" panose="020B0609020204030204" pitchFamily="49" charset="0"/>
-                <a:ea typeface="宋体" panose="02010600030101010101" pitchFamily="2" charset="-122"/>
+                <a:latin typeface="等线" panose="02010600030101010101" pitchFamily="2" charset="-122"/>
+                <a:ea typeface="等线" panose="02010600030101010101" pitchFamily="2" charset="-122"/>
+                <a:cs typeface="Courier New" panose="02070309020205020404" pitchFamily="49" charset="0"/>
               </a:rPr>
               <a:t>GS</a:t>
             </a:r>
@@ -11950,8 +12150,9 @@
                 <a:solidFill>
                   <a:schemeClr val="bg1"/>
                 </a:solidFill>
-                <a:latin typeface="Consolas" panose="020B0609020204030204" pitchFamily="49" charset="0"/>
-                <a:ea typeface="宋体" panose="02010600030101010101" pitchFamily="2" charset="-122"/>
+                <a:latin typeface="等线" panose="02010600030101010101" pitchFamily="2" charset="-122"/>
+                <a:ea typeface="等线" panose="02010600030101010101" pitchFamily="2" charset="-122"/>
+                <a:cs typeface="Courier New" panose="02070309020205020404" pitchFamily="49" charset="0"/>
               </a:rPr>
               <a:t>Ext JS</a:t>
             </a:r>
@@ -12015,8 +12216,9 @@
                 <a:solidFill>
                   <a:schemeClr val="bg1"/>
                 </a:solidFill>
-                <a:latin typeface="Consolas" panose="020B0609020204030204" pitchFamily="49" charset="0"/>
-                <a:ea typeface="宋体" panose="02010600030101010101" pitchFamily="2" charset="-122"/>
+                <a:latin typeface="等线" panose="02010600030101010101" pitchFamily="2" charset="-122"/>
+                <a:ea typeface="等线" panose="02010600030101010101" pitchFamily="2" charset="-122"/>
+                <a:cs typeface="Courier New" panose="02070309020205020404" pitchFamily="49" charset="0"/>
               </a:rPr>
               <a:t>Toast</a:t>
             </a:r>
@@ -12080,8 +12282,9 @@
                 <a:solidFill>
                   <a:schemeClr val="bg1"/>
                 </a:solidFill>
-                <a:latin typeface="Consolas" panose="020B0609020204030204" pitchFamily="49" charset="0"/>
-                <a:ea typeface="宋体" panose="02010600030101010101" pitchFamily="2" charset="-122"/>
+                <a:latin typeface="等线" panose="02010600030101010101" pitchFamily="2" charset="-122"/>
+                <a:ea typeface="等线" panose="02010600030101010101" pitchFamily="2" charset="-122"/>
+                <a:cs typeface="Courier New" panose="02070309020205020404" pitchFamily="49" charset="0"/>
               </a:rPr>
               <a:t>YAML</a:t>
             </a:r>
@@ -12151,8 +12354,9 @@
                 <a:solidFill>
                   <a:schemeClr val="bg1"/>
                 </a:solidFill>
-                <a:latin typeface="Consolas" panose="020B0609020204030204" pitchFamily="49" charset="0"/>
-                <a:ea typeface="宋体" panose="02010600030101010101" pitchFamily="2" charset="-122"/>
+                <a:latin typeface="等线" panose="02010600030101010101" pitchFamily="2" charset="-122"/>
+                <a:ea typeface="等线" panose="02010600030101010101" pitchFamily="2" charset="-122"/>
+                <a:cs typeface="Courier New" panose="02070309020205020404" pitchFamily="49" charset="0"/>
               </a:rPr>
               <a:t>Intermediate</a:t>
             </a:r>
@@ -12164,8 +12368,9 @@
                 <a:solidFill>
                   <a:schemeClr val="bg1"/>
                 </a:solidFill>
-                <a:latin typeface="Consolas" panose="020B0609020204030204" pitchFamily="49" charset="0"/>
-                <a:ea typeface="宋体" panose="02010600030101010101" pitchFamily="2" charset="-122"/>
+                <a:latin typeface="等线" panose="02010600030101010101" pitchFamily="2" charset="-122"/>
+                <a:ea typeface="等线" panose="02010600030101010101" pitchFamily="2" charset="-122"/>
+                <a:cs typeface="Courier New" panose="02070309020205020404" pitchFamily="49" charset="0"/>
               </a:rPr>
               <a:t>Languages</a:t>
             </a:r>
@@ -12229,8 +12434,9 @@
                 <a:solidFill>
                   <a:schemeClr val="bg1"/>
                 </a:solidFill>
-                <a:latin typeface="Consolas" panose="020B0609020204030204" pitchFamily="49" charset="0"/>
-                <a:ea typeface="宋体" panose="02010600030101010101" pitchFamily="2" charset="-122"/>
+                <a:latin typeface="等线" panose="02010600030101010101" pitchFamily="2" charset="-122"/>
+                <a:ea typeface="等线" panose="02010600030101010101" pitchFamily="2" charset="-122"/>
+                <a:cs typeface="Courier New" panose="02070309020205020404" pitchFamily="49" charset="0"/>
               </a:rPr>
               <a:t>CoffeeScript</a:t>
             </a:r>
@@ -12294,8 +12500,9 @@
                 <a:solidFill>
                   <a:schemeClr val="bg1"/>
                 </a:solidFill>
-                <a:latin typeface="Consolas" panose="020B0609020204030204" pitchFamily="49" charset="0"/>
-                <a:ea typeface="宋体" panose="02010600030101010101" pitchFamily="2" charset="-122"/>
+                <a:latin typeface="等线" panose="02010600030101010101" pitchFamily="2" charset="-122"/>
+                <a:ea typeface="等线" panose="02010600030101010101" pitchFamily="2" charset="-122"/>
+                <a:cs typeface="Courier New" panose="02070309020205020404" pitchFamily="49" charset="0"/>
               </a:rPr>
               <a:t>TypeScript</a:t>
             </a:r>
@@ -12359,8 +12566,9 @@
                 <a:solidFill>
                   <a:schemeClr val="bg1"/>
                 </a:solidFill>
-                <a:latin typeface="Consolas" panose="020B0609020204030204" pitchFamily="49" charset="0"/>
-                <a:ea typeface="宋体" panose="02010600030101010101" pitchFamily="2" charset="-122"/>
+                <a:latin typeface="等线" panose="02010600030101010101" pitchFamily="2" charset="-122"/>
+                <a:ea typeface="等线" panose="02010600030101010101" pitchFamily="2" charset="-122"/>
+                <a:cs typeface="Courier New" panose="02070309020205020404" pitchFamily="49" charset="0"/>
               </a:rPr>
               <a:t>Dart</a:t>
             </a:r>
@@ -12424,8 +12632,9 @@
                 <a:solidFill>
                   <a:schemeClr val="bg1"/>
                 </a:solidFill>
-                <a:latin typeface="Consolas" panose="020B0609020204030204" pitchFamily="49" charset="0"/>
-                <a:ea typeface="宋体" panose="02010600030101010101" pitchFamily="2" charset="-122"/>
+                <a:latin typeface="等线" panose="02010600030101010101" pitchFamily="2" charset="-122"/>
+                <a:ea typeface="等线" panose="02010600030101010101" pitchFamily="2" charset="-122"/>
+                <a:cs typeface="Courier New" panose="02070309020205020404" pitchFamily="49" charset="0"/>
               </a:rPr>
               <a:t>LiveScript</a:t>
             </a:r>
@@ -12489,8 +12698,9 @@
                 <a:solidFill>
                   <a:schemeClr val="bg1"/>
                 </a:solidFill>
-                <a:latin typeface="Consolas" panose="020B0609020204030204" pitchFamily="49" charset="0"/>
-                <a:ea typeface="宋体" panose="02010600030101010101" pitchFamily="2" charset="-122"/>
+                <a:latin typeface="等线" panose="02010600030101010101" pitchFamily="2" charset="-122"/>
+                <a:ea typeface="等线" panose="02010600030101010101" pitchFamily="2" charset="-122"/>
+                <a:cs typeface="Courier New" panose="02070309020205020404" pitchFamily="49" charset="0"/>
               </a:rPr>
               <a:t>ClojureScript</a:t>
             </a:r>
@@ -12560,8 +12770,9 @@
                 <a:solidFill>
                   <a:schemeClr val="bg1"/>
                 </a:solidFill>
-                <a:latin typeface="Consolas" panose="020B0609020204030204" pitchFamily="49" charset="0"/>
-                <a:ea typeface="宋体" panose="02010600030101010101" pitchFamily="2" charset="-122"/>
+                <a:latin typeface="等线" panose="02010600030101010101" pitchFamily="2" charset="-122"/>
+                <a:ea typeface="等线" panose="02010600030101010101" pitchFamily="2" charset="-122"/>
+                <a:cs typeface="Courier New" panose="02070309020205020404" pitchFamily="49" charset="0"/>
               </a:rPr>
               <a:t>Platforms</a:t>
             </a:r>
@@ -12625,8 +12836,9 @@
                 <a:solidFill>
                   <a:schemeClr val="bg1"/>
                 </a:solidFill>
-                <a:latin typeface="Consolas" panose="020B0609020204030204" pitchFamily="49" charset="0"/>
-                <a:ea typeface="宋体" panose="02010600030101010101" pitchFamily="2" charset="-122"/>
+                <a:latin typeface="等线" panose="02010600030101010101" pitchFamily="2" charset="-122"/>
+                <a:ea typeface="等线" panose="02010600030101010101" pitchFamily="2" charset="-122"/>
+                <a:cs typeface="Courier New" panose="02070309020205020404" pitchFamily="49" charset="0"/>
               </a:rPr>
               <a:t>PhoneGap</a:t>
             </a:r>
@@ -12690,8 +12902,9 @@
                 <a:solidFill>
                   <a:schemeClr val="bg1"/>
                 </a:solidFill>
-                <a:latin typeface="Consolas" panose="020B0609020204030204" pitchFamily="49" charset="0"/>
-                <a:ea typeface="宋体" panose="02010600030101010101" pitchFamily="2" charset="-122"/>
+                <a:latin typeface="等线" panose="02010600030101010101" pitchFamily="2" charset="-122"/>
+                <a:ea typeface="等线" panose="02010600030101010101" pitchFamily="2" charset="-122"/>
+                <a:cs typeface="Courier New" panose="02070309020205020404" pitchFamily="49" charset="0"/>
               </a:rPr>
               <a:t>Cordova</a:t>
             </a:r>
@@ -12755,8 +12968,9 @@
                 <a:solidFill>
                   <a:schemeClr val="bg1"/>
                 </a:solidFill>
-                <a:latin typeface="Consolas" panose="020B0609020204030204" pitchFamily="49" charset="0"/>
-                <a:ea typeface="宋体" panose="02010600030101010101" pitchFamily="2" charset="-122"/>
+                <a:latin typeface="等线" panose="02010600030101010101" pitchFamily="2" charset="-122"/>
+                <a:ea typeface="等线" panose="02010600030101010101" pitchFamily="2" charset="-122"/>
+                <a:cs typeface="Courier New" panose="02070309020205020404" pitchFamily="49" charset="0"/>
               </a:rPr>
               <a:t>Appcelerator</a:t>
             </a:r>
@@ -12820,8 +13034,9 @@
                 <a:solidFill>
                   <a:schemeClr val="bg1"/>
                 </a:solidFill>
-                <a:latin typeface="Consolas" panose="020B0609020204030204" pitchFamily="49" charset="0"/>
-                <a:ea typeface="宋体" panose="02010600030101010101" pitchFamily="2" charset="-122"/>
+                <a:latin typeface="等线" panose="02010600030101010101" pitchFamily="2" charset="-122"/>
+                <a:ea typeface="等线" panose="02010600030101010101" pitchFamily="2" charset="-122"/>
+                <a:cs typeface="Courier New" panose="02070309020205020404" pitchFamily="49" charset="0"/>
               </a:rPr>
               <a:t>appMobi</a:t>
             </a:r>
@@ -12885,13 +13100,16 @@
                 <a:solidFill>
                   <a:schemeClr val="bg1"/>
                 </a:solidFill>
-                <a:latin typeface="Consolas" panose="020B0609020204030204" pitchFamily="49" charset="0"/>
-                <a:ea typeface="宋体" panose="02010600030101010101" pitchFamily="2" charset="-122"/>
+                <a:latin typeface="等线" panose="02010600030101010101" pitchFamily="2" charset="-122"/>
+                <a:ea typeface="等线" panose="02010600030101010101" pitchFamily="2" charset="-122"/>
+                <a:cs typeface="Courier New" panose="02070309020205020404" pitchFamily="49" charset="0"/>
               </a:rPr>
               <a:t>trigger.io </a:t>
             </a:r>
             <a:endParaRPr lang="zh-CN" altLang="en-US">
-              <a:ea typeface="宋体" panose="02010600030101010101" pitchFamily="2" charset="-122"/>
+              <a:latin typeface="等线" panose="02010600030101010101" pitchFamily="2" charset="-122"/>
+              <a:ea typeface="等线" panose="02010600030101010101" pitchFamily="2" charset="-122"/>
+              <a:cs typeface="Courier New" panose="02070309020205020404" pitchFamily="49" charset="0"/>
             </a:endParaRPr>
           </a:p>
         </p:txBody>
@@ -12959,8 +13177,9 @@
                 <a:solidFill>
                   <a:schemeClr val="bg1"/>
                 </a:solidFill>
-                <a:latin typeface="Consolas" panose="020B0609020204030204" pitchFamily="49" charset="0"/>
-                <a:ea typeface="宋体" panose="02010600030101010101" pitchFamily="2" charset="-122"/>
+                <a:latin typeface="等线" panose="02010600030101010101" pitchFamily="2" charset="-122"/>
+                <a:ea typeface="等线" panose="02010600030101010101" pitchFamily="2" charset="-122"/>
+                <a:cs typeface="Courier New" panose="02070309020205020404" pitchFamily="49" charset="0"/>
               </a:rPr>
               <a:t>Mobile UI</a:t>
             </a:r>
@@ -13024,8 +13243,9 @@
                 <a:solidFill>
                   <a:schemeClr val="bg1"/>
                 </a:solidFill>
-                <a:latin typeface="Consolas" panose="020B0609020204030204" pitchFamily="49" charset="0"/>
-                <a:ea typeface="宋体" panose="02010600030101010101" pitchFamily="2" charset="-122"/>
+                <a:latin typeface="等线" panose="02010600030101010101" pitchFamily="2" charset="-122"/>
+                <a:ea typeface="等线" panose="02010600030101010101" pitchFamily="2" charset="-122"/>
+                <a:cs typeface="Courier New" panose="02070309020205020404" pitchFamily="49" charset="0"/>
               </a:rPr>
               <a:t>Sencha</a:t>
             </a:r>
@@ -13089,8 +13309,9 @@
                 <a:solidFill>
                   <a:schemeClr val="bg1"/>
                 </a:solidFill>
-                <a:latin typeface="Consolas" panose="020B0609020204030204" pitchFamily="49" charset="0"/>
-                <a:ea typeface="宋体" panose="02010600030101010101" pitchFamily="2" charset="-122"/>
+                <a:latin typeface="等线" panose="02010600030101010101" pitchFamily="2" charset="-122"/>
+                <a:ea typeface="等线" panose="02010600030101010101" pitchFamily="2" charset="-122"/>
+                <a:cs typeface="Courier New" panose="02070309020205020404" pitchFamily="49" charset="0"/>
               </a:rPr>
               <a:t>jQueryMobile</a:t>
             </a:r>
@@ -13154,8 +13375,9 @@
                 <a:solidFill>
                   <a:schemeClr val="bg1"/>
                 </a:solidFill>
-                <a:latin typeface="Consolas" panose="020B0609020204030204" pitchFamily="49" charset="0"/>
-                <a:ea typeface="宋体" panose="02010600030101010101" pitchFamily="2" charset="-122"/>
+                <a:latin typeface="等线" panose="02010600030101010101" pitchFamily="2" charset="-122"/>
+                <a:ea typeface="等线" panose="02010600030101010101" pitchFamily="2" charset="-122"/>
+                <a:cs typeface="Courier New" panose="02070309020205020404" pitchFamily="49" charset="0"/>
               </a:rPr>
               <a:t>Kendo UI</a:t>
             </a:r>
@@ -13219,8 +13441,9 @@
                 <a:solidFill>
                   <a:schemeClr val="bg1"/>
                 </a:solidFill>
-                <a:latin typeface="Consolas" panose="020B0609020204030204" pitchFamily="49" charset="0"/>
-                <a:ea typeface="宋体" panose="02010600030101010101" pitchFamily="2" charset="-122"/>
+                <a:latin typeface="等线" panose="02010600030101010101" pitchFamily="2" charset="-122"/>
+                <a:ea typeface="等线" panose="02010600030101010101" pitchFamily="2" charset="-122"/>
+                <a:cs typeface="Courier New" panose="02070309020205020404" pitchFamily="49" charset="0"/>
               </a:rPr>
               <a:t>Jo</a:t>
             </a:r>
@@ -13284,8 +13507,9 @@
                 <a:solidFill>
                   <a:schemeClr val="bg1"/>
                 </a:solidFill>
-                <a:latin typeface="Consolas" panose="020B0609020204030204" pitchFamily="49" charset="0"/>
-                <a:ea typeface="宋体" panose="02010600030101010101" pitchFamily="2" charset="-122"/>
+                <a:latin typeface="等线" panose="02010600030101010101" pitchFamily="2" charset="-122"/>
+                <a:ea typeface="等线" panose="02010600030101010101" pitchFamily="2" charset="-122"/>
+                <a:cs typeface="Courier New" panose="02070309020205020404" pitchFamily="49" charset="0"/>
               </a:rPr>
               <a:t>WinkUI</a:t>
             </a:r>
@@ -13349,8 +13573,9 @@
                 <a:solidFill>
                   <a:schemeClr val="bg1"/>
                 </a:solidFill>
-                <a:latin typeface="Consolas" panose="020B0609020204030204" pitchFamily="49" charset="0"/>
-                <a:ea typeface="宋体" panose="02010600030101010101" pitchFamily="2" charset="-122"/>
+                <a:latin typeface="等线" panose="02010600030101010101" pitchFamily="2" charset="-122"/>
+                <a:ea typeface="等线" panose="02010600030101010101" pitchFamily="2" charset="-122"/>
+                <a:cs typeface="Courier New" panose="02070309020205020404" pitchFamily="49" charset="0"/>
               </a:rPr>
               <a:t>DojoMobile</a:t>
             </a:r>
@@ -13414,8 +13639,9 @@
                 <a:solidFill>
                   <a:schemeClr val="bg1"/>
                 </a:solidFill>
-                <a:latin typeface="Consolas" panose="020B0609020204030204" pitchFamily="49" charset="0"/>
-                <a:ea typeface="宋体" panose="02010600030101010101" pitchFamily="2" charset="-122"/>
+                <a:latin typeface="等线" panose="02010600030101010101" pitchFamily="2" charset="-122"/>
+                <a:ea typeface="等线" panose="02010600030101010101" pitchFamily="2" charset="-122"/>
+                <a:cs typeface="Courier New" panose="02070309020205020404" pitchFamily="49" charset="0"/>
               </a:rPr>
               <a:t>Lungo</a:t>
             </a:r>
@@ -13479,8 +13705,9 @@
                 <a:solidFill>
                   <a:schemeClr val="bg1"/>
                 </a:solidFill>
-                <a:latin typeface="Consolas" panose="020B0609020204030204" pitchFamily="49" charset="0"/>
-                <a:ea typeface="宋体" panose="02010600030101010101" pitchFamily="2" charset="-122"/>
+                <a:latin typeface="等线" panose="02010600030101010101" pitchFamily="2" charset="-122"/>
+                <a:ea typeface="等线" panose="02010600030101010101" pitchFamily="2" charset="-122"/>
+                <a:cs typeface="Courier New" panose="02070309020205020404" pitchFamily="49" charset="0"/>
               </a:rPr>
               <a:t>React</a:t>
             </a:r>
@@ -13544,8 +13771,9 @@
                 <a:solidFill>
                   <a:schemeClr val="bg1"/>
                 </a:solidFill>
-                <a:latin typeface="Consolas" panose="020B0609020204030204" pitchFamily="49" charset="0"/>
-                <a:ea typeface="宋体" panose="02010600030101010101" pitchFamily="2" charset="-122"/>
+                <a:latin typeface="等线" panose="02010600030101010101" pitchFamily="2" charset="-122"/>
+                <a:ea typeface="等线" panose="02010600030101010101" pitchFamily="2" charset="-122"/>
+                <a:cs typeface="Courier New" panose="02070309020205020404" pitchFamily="49" charset="0"/>
               </a:rPr>
               <a:t>polymer</a:t>
             </a:r>
@@ -13609,8 +13837,9 @@
                 <a:solidFill>
                   <a:schemeClr val="bg1"/>
                 </a:solidFill>
-                <a:latin typeface="Consolas" panose="020B0609020204030204" pitchFamily="49" charset="0"/>
-                <a:ea typeface="宋体" panose="02010600030101010101" pitchFamily="2" charset="-122"/>
+                <a:latin typeface="等线" panose="02010600030101010101" pitchFamily="2" charset="-122"/>
+                <a:ea typeface="等线" panose="02010600030101010101" pitchFamily="2" charset="-122"/>
+                <a:cs typeface="Courier New" panose="02070309020205020404" pitchFamily="49" charset="0"/>
               </a:rPr>
               <a:t>flux</a:t>
             </a:r>
@@ -13674,8 +13903,9 @@
                 <a:solidFill>
                   <a:schemeClr val="bg1"/>
                 </a:solidFill>
-                <a:latin typeface="Consolas" panose="020B0609020204030204" pitchFamily="49" charset="0"/>
-                <a:ea typeface="宋体" panose="02010600030101010101" pitchFamily="2" charset="-122"/>
+                <a:latin typeface="等线" panose="02010600030101010101" pitchFamily="2" charset="-122"/>
+                <a:ea typeface="等线" panose="02010600030101010101" pitchFamily="2" charset="-122"/>
+                <a:cs typeface="Courier New" panose="02070309020205020404" pitchFamily="49" charset="0"/>
               </a:rPr>
               <a:t>Yeoman</a:t>
             </a:r>
@@ -13739,7 +13969,9 @@
                 <a:solidFill>
                   <a:schemeClr val="bg1"/>
                 </a:solidFill>
-                <a:latin typeface="Consolas" panose="020B0609020204030204" pitchFamily="49" charset="0"/>
+                <a:latin typeface="等线" panose="02010600030101010101" pitchFamily="2" charset="-122"/>
+                <a:ea typeface="等线" panose="02010600030101010101" pitchFamily="2" charset="-122"/>
+                <a:cs typeface="Courier New" panose="02070309020205020404" pitchFamily="49" charset="0"/>
               </a:rPr>
               <a:t>Lineman</a:t>
             </a:r>
@@ -13803,8 +14035,9 @@
                 <a:solidFill>
                   <a:schemeClr val="bg1"/>
                 </a:solidFill>
-                <a:latin typeface="Consolas" panose="020B0609020204030204" pitchFamily="49" charset="0"/>
-                <a:ea typeface="宋体" panose="02010600030101010101" pitchFamily="2" charset="-122"/>
+                <a:latin typeface="等线" panose="02010600030101010101" pitchFamily="2" charset="-122"/>
+                <a:ea typeface="等线" panose="02010600030101010101" pitchFamily="2" charset="-122"/>
+                <a:cs typeface="Courier New" panose="02070309020205020404" pitchFamily="49" charset="0"/>
               </a:rPr>
               <a:t>Fiddler</a:t>
             </a:r>
@@ -13868,8 +14101,9 @@
                 <a:solidFill>
                   <a:schemeClr val="bg1"/>
                 </a:solidFill>
-                <a:latin typeface="Consolas" panose="020B0609020204030204" pitchFamily="49" charset="0"/>
-                <a:ea typeface="宋体" panose="02010600030101010101" pitchFamily="2" charset="-122"/>
+                <a:latin typeface="等线" panose="02010600030101010101" pitchFamily="2" charset="-122"/>
+                <a:ea typeface="等线" panose="02010600030101010101" pitchFamily="2" charset="-122"/>
+                <a:cs typeface="Courier New" panose="02070309020205020404" pitchFamily="49" charset="0"/>
               </a:rPr>
               <a:t>Dragonfly</a:t>
             </a:r>
@@ -13933,8 +14167,9 @@
                 <a:solidFill>
                   <a:schemeClr val="bg1"/>
                 </a:solidFill>
-                <a:latin typeface="Consolas" panose="020B0609020204030204" pitchFamily="49" charset="0"/>
-                <a:ea typeface="宋体" panose="02010600030101010101" pitchFamily="2" charset="-122"/>
+                <a:latin typeface="等线" panose="02010600030101010101" pitchFamily="2" charset="-122"/>
+                <a:ea typeface="等线" panose="02010600030101010101" pitchFamily="2" charset="-122"/>
+                <a:cs typeface="Courier New" panose="02070309020205020404" pitchFamily="49" charset="0"/>
               </a:rPr>
               <a:t>CSRF</a:t>
             </a:r>
@@ -14004,8 +14239,9 @@
                 <a:solidFill>
                   <a:schemeClr val="bg1"/>
                 </a:solidFill>
-                <a:latin typeface="Consolas" panose="020B0609020204030204" pitchFamily="49" charset="0"/>
-                <a:ea typeface="宋体" panose="02010600030101010101" pitchFamily="2" charset="-122"/>
+                <a:latin typeface="等线" panose="02010600030101010101" pitchFamily="2" charset="-122"/>
+                <a:ea typeface="等线" panose="02010600030101010101" pitchFamily="2" charset="-122"/>
+                <a:cs typeface="Courier New" panose="02070309020205020404" pitchFamily="49" charset="0"/>
               </a:rPr>
               <a:t>HTTP/1.1</a:t>
             </a:r>
@@ -14069,8 +14305,9 @@
                 <a:solidFill>
                   <a:schemeClr val="bg1"/>
                 </a:solidFill>
-                <a:latin typeface="Consolas" panose="020B0609020204030204" pitchFamily="49" charset="0"/>
-                <a:ea typeface="宋体" panose="02010600030101010101" pitchFamily="2" charset="-122"/>
+                <a:latin typeface="等线" panose="02010600030101010101" pitchFamily="2" charset="-122"/>
+                <a:ea typeface="等线" panose="02010600030101010101" pitchFamily="2" charset="-122"/>
+                <a:cs typeface="Courier New" panose="02070309020205020404" pitchFamily="49" charset="0"/>
               </a:rPr>
               <a:t>Request</a:t>
             </a:r>
@@ -14082,8 +14319,9 @@
                 <a:solidFill>
                   <a:schemeClr val="bg1"/>
                 </a:solidFill>
-                <a:latin typeface="Consolas" panose="020B0609020204030204" pitchFamily="49" charset="0"/>
-                <a:ea typeface="宋体" panose="02010600030101010101" pitchFamily="2" charset="-122"/>
+                <a:latin typeface="等线" panose="02010600030101010101" pitchFamily="2" charset="-122"/>
+                <a:ea typeface="等线" panose="02010600030101010101" pitchFamily="2" charset="-122"/>
+                <a:cs typeface="Courier New" panose="02070309020205020404" pitchFamily="49" charset="0"/>
               </a:rPr>
               <a:t>(Headers, Body)</a:t>
             </a:r>
@@ -14147,8 +14385,9 @@
                 <a:solidFill>
                   <a:schemeClr val="bg1"/>
                 </a:solidFill>
-                <a:latin typeface="Consolas" panose="020B0609020204030204" pitchFamily="49" charset="0"/>
-                <a:ea typeface="宋体" panose="02010600030101010101" pitchFamily="2" charset="-122"/>
+                <a:latin typeface="等线" panose="02010600030101010101" pitchFamily="2" charset="-122"/>
+                <a:ea typeface="等线" panose="02010600030101010101" pitchFamily="2" charset="-122"/>
+                <a:cs typeface="Courier New" panose="02070309020205020404" pitchFamily="49" charset="0"/>
               </a:rPr>
               <a:t>URI</a:t>
             </a:r>
@@ -14212,8 +14451,9 @@
                 <a:solidFill>
                   <a:schemeClr val="bg1"/>
                 </a:solidFill>
-                <a:latin typeface="Consolas" panose="020B0609020204030204" pitchFamily="49" charset="0"/>
-                <a:ea typeface="宋体" panose="02010600030101010101" pitchFamily="2" charset="-122"/>
+                <a:latin typeface="等线" panose="02010600030101010101" pitchFamily="2" charset="-122"/>
+                <a:ea typeface="等线" panose="02010600030101010101" pitchFamily="2" charset="-122"/>
+                <a:cs typeface="Courier New" panose="02070309020205020404" pitchFamily="49" charset="0"/>
               </a:rPr>
               <a:t>Request </a:t>
             </a:r>
@@ -14222,8 +14462,9 @@
                 <a:solidFill>
                   <a:schemeClr val="bg1"/>
                 </a:solidFill>
-                <a:latin typeface="Consolas" panose="020B0609020204030204" pitchFamily="49" charset="0"/>
-                <a:ea typeface="宋体" panose="02010600030101010101" pitchFamily="2" charset="-122"/>
+                <a:latin typeface="等线" panose="02010600030101010101" pitchFamily="2" charset="-122"/>
+                <a:ea typeface="等线" panose="02010600030101010101" pitchFamily="2" charset="-122"/>
+                <a:cs typeface="Courier New" panose="02070309020205020404" pitchFamily="49" charset="0"/>
               </a:rPr>
               <a:t>M</a:t>
             </a:r>
@@ -14232,8 +14473,9 @@
                 <a:solidFill>
                   <a:schemeClr val="bg1"/>
                 </a:solidFill>
-                <a:latin typeface="Consolas" panose="020B0609020204030204" pitchFamily="49" charset="0"/>
-                <a:ea typeface="宋体" panose="02010600030101010101" pitchFamily="2" charset="-122"/>
+                <a:latin typeface="等线" panose="02010600030101010101" pitchFamily="2" charset="-122"/>
+                <a:ea typeface="等线" panose="02010600030101010101" pitchFamily="2" charset="-122"/>
+                <a:cs typeface="Courier New" panose="02070309020205020404" pitchFamily="49" charset="0"/>
               </a:rPr>
               <a:t>ethod</a:t>
             </a:r>
@@ -14242,8 +14484,9 @@
                 <a:solidFill>
                   <a:schemeClr val="bg1"/>
                 </a:solidFill>
-                <a:latin typeface="Consolas" panose="020B0609020204030204" pitchFamily="49" charset="0"/>
-                <a:ea typeface="宋体" panose="02010600030101010101" pitchFamily="2" charset="-122"/>
+                <a:latin typeface="等线" panose="02010600030101010101" pitchFamily="2" charset="-122"/>
+                <a:ea typeface="等线" panose="02010600030101010101" pitchFamily="2" charset="-122"/>
+                <a:cs typeface="Courier New" panose="02070309020205020404" pitchFamily="49" charset="0"/>
               </a:rPr>
               <a:t>s</a:t>
             </a:r>
@@ -14255,8 +14498,9 @@
                 <a:solidFill>
                   <a:schemeClr val="bg1"/>
                 </a:solidFill>
-                <a:latin typeface="Consolas" panose="020B0609020204030204" pitchFamily="49" charset="0"/>
-                <a:ea typeface="宋体" panose="02010600030101010101" pitchFamily="2" charset="-122"/>
+                <a:latin typeface="等线" panose="02010600030101010101" pitchFamily="2" charset="-122"/>
+                <a:ea typeface="等线" panose="02010600030101010101" pitchFamily="2" charset="-122"/>
+                <a:cs typeface="Courier New" panose="02070309020205020404" pitchFamily="49" charset="0"/>
               </a:rPr>
               <a:t>(GET, POST, HEAD, PUT, DELETE, OPTIONS...)</a:t>
             </a:r>
@@ -14320,8 +14564,9 @@
                 <a:solidFill>
                   <a:schemeClr val="bg1"/>
                 </a:solidFill>
-                <a:latin typeface="Consolas" panose="020B0609020204030204" pitchFamily="49" charset="0"/>
-                <a:ea typeface="宋体" panose="02010600030101010101" pitchFamily="2" charset="-122"/>
+                <a:latin typeface="等线" panose="02010600030101010101" pitchFamily="2" charset="-122"/>
+                <a:ea typeface="等线" panose="02010600030101010101" pitchFamily="2" charset="-122"/>
+                <a:cs typeface="Courier New" panose="02070309020205020404" pitchFamily="49" charset="0"/>
               </a:rPr>
               <a:t>Session</a:t>
             </a:r>
@@ -14385,8 +14630,9 @@
                 <a:solidFill>
                   <a:schemeClr val="bg1"/>
                 </a:solidFill>
-                <a:latin typeface="Consolas" panose="020B0609020204030204" pitchFamily="49" charset="0"/>
-                <a:ea typeface="宋体" panose="02010600030101010101" pitchFamily="2" charset="-122"/>
+                <a:latin typeface="等线" panose="02010600030101010101" pitchFamily="2" charset="-122"/>
+                <a:ea typeface="等线" panose="02010600030101010101" pitchFamily="2" charset="-122"/>
+                <a:cs typeface="Courier New" panose="02070309020205020404" pitchFamily="49" charset="0"/>
               </a:rPr>
               <a:t>Authentication</a:t>
             </a:r>
@@ -14450,8 +14696,9 @@
                 <a:solidFill>
                   <a:schemeClr val="bg1"/>
                 </a:solidFill>
-                <a:latin typeface="Consolas" panose="020B0609020204030204" pitchFamily="49" charset="0"/>
-                <a:ea typeface="宋体" panose="02010600030101010101" pitchFamily="2" charset="-122"/>
+                <a:latin typeface="等线" panose="02010600030101010101" pitchFamily="2" charset="-122"/>
+                <a:ea typeface="等线" panose="02010600030101010101" pitchFamily="2" charset="-122"/>
+                <a:cs typeface="Courier New" panose="02070309020205020404" pitchFamily="49" charset="0"/>
               </a:rPr>
               <a:t>Response</a:t>
             </a:r>
@@ -14463,8 +14710,9 @@
                 <a:solidFill>
                   <a:schemeClr val="bg1"/>
                 </a:solidFill>
-                <a:latin typeface="Consolas" panose="020B0609020204030204" pitchFamily="49" charset="0"/>
-                <a:ea typeface="宋体" panose="02010600030101010101" pitchFamily="2" charset="-122"/>
+                <a:latin typeface="等线" panose="02010600030101010101" pitchFamily="2" charset="-122"/>
+                <a:ea typeface="等线" panose="02010600030101010101" pitchFamily="2" charset="-122"/>
+                <a:cs typeface="Courier New" panose="02070309020205020404" pitchFamily="49" charset="0"/>
               </a:rPr>
               <a:t>(Headers, Body)</a:t>
             </a:r>
@@ -14528,8 +14776,9 @@
                 <a:solidFill>
                   <a:schemeClr val="bg1"/>
                 </a:solidFill>
-                <a:latin typeface="Consolas" panose="020B0609020204030204" pitchFamily="49" charset="0"/>
-                <a:ea typeface="宋体" panose="02010600030101010101" pitchFamily="2" charset="-122"/>
+                <a:latin typeface="等线" panose="02010600030101010101" pitchFamily="2" charset="-122"/>
+                <a:ea typeface="等线" panose="02010600030101010101" pitchFamily="2" charset="-122"/>
+                <a:cs typeface="Courier New" panose="02070309020205020404" pitchFamily="49" charset="0"/>
               </a:rPr>
               <a:t>Status Code</a:t>
             </a:r>
@@ -14541,8 +14790,9 @@
                 <a:solidFill>
                   <a:schemeClr val="bg1"/>
                 </a:solidFill>
-                <a:latin typeface="Consolas" panose="020B0609020204030204" pitchFamily="49" charset="0"/>
-                <a:ea typeface="宋体" panose="02010600030101010101" pitchFamily="2" charset="-122"/>
+                <a:latin typeface="等线" panose="02010600030101010101" pitchFamily="2" charset="-122"/>
+                <a:ea typeface="等线" panose="02010600030101010101" pitchFamily="2" charset="-122"/>
+                <a:cs typeface="Courier New" panose="02070309020205020404" pitchFamily="49" charset="0"/>
               </a:rPr>
               <a:t>(2xx, 3xx, 4xx, 5xx ...)</a:t>
             </a:r>
@@ -14612,8 +14862,9 @@
                 <a:solidFill>
                   <a:schemeClr val="bg1"/>
                 </a:solidFill>
-                <a:latin typeface="Consolas" panose="020B0609020204030204" pitchFamily="49" charset="0"/>
-                <a:ea typeface="宋体" panose="02010600030101010101" pitchFamily="2" charset="-122"/>
+                <a:latin typeface="等线" panose="02010600030101010101" pitchFamily="2" charset="-122"/>
+                <a:ea typeface="等线" panose="02010600030101010101" pitchFamily="2" charset="-122"/>
+                <a:cs typeface="Courier New" panose="02070309020205020404" pitchFamily="49" charset="0"/>
               </a:rPr>
               <a:t>HTTP/2</a:t>
             </a:r>
@@ -14677,8 +14928,9 @@
                 <a:solidFill>
                   <a:schemeClr val="bg1"/>
                 </a:solidFill>
-                <a:latin typeface="Consolas" panose="020B0609020204030204" pitchFamily="49" charset="0"/>
-                <a:ea typeface="宋体" panose="02010600030101010101" pitchFamily="2" charset="-122"/>
+                <a:latin typeface="等线" panose="02010600030101010101" pitchFamily="2" charset="-122"/>
+                <a:ea typeface="等线" panose="02010600030101010101" pitchFamily="2" charset="-122"/>
+                <a:cs typeface="Courier New" panose="02070309020205020404" pitchFamily="49" charset="0"/>
               </a:rPr>
               <a:t>Compression</a:t>
             </a:r>
@@ -14742,8 +14994,9 @@
                 <a:solidFill>
                   <a:schemeClr val="bg1"/>
                 </a:solidFill>
-                <a:latin typeface="Consolas" panose="020B0609020204030204" pitchFamily="49" charset="0"/>
-                <a:ea typeface="宋体" panose="02010600030101010101" pitchFamily="2" charset="-122"/>
+                <a:latin typeface="等线" panose="02010600030101010101" pitchFamily="2" charset="-122"/>
+                <a:ea typeface="等线" panose="02010600030101010101" pitchFamily="2" charset="-122"/>
+                <a:cs typeface="Courier New" panose="02070309020205020404" pitchFamily="49" charset="0"/>
               </a:rPr>
               <a:t>Encryption</a:t>
             </a:r>
@@ -14807,8 +15060,9 @@
                 <a:solidFill>
                   <a:schemeClr val="bg1"/>
                 </a:solidFill>
-                <a:latin typeface="Consolas" panose="020B0609020204030204" pitchFamily="49" charset="0"/>
-                <a:ea typeface="宋体" panose="02010600030101010101" pitchFamily="2" charset="-122"/>
+                <a:latin typeface="等线" panose="02010600030101010101" pitchFamily="2" charset="-122"/>
+                <a:ea typeface="等线" panose="02010600030101010101" pitchFamily="2" charset="-122"/>
+                <a:cs typeface="Courier New" panose="02070309020205020404" pitchFamily="49" charset="0"/>
               </a:rPr>
               <a:t>Minification</a:t>
             </a:r>
@@ -14872,8 +15126,9 @@
                 <a:solidFill>
                   <a:schemeClr val="bg1"/>
                 </a:solidFill>
-                <a:latin typeface="Consolas" panose="020B0609020204030204" pitchFamily="49" charset="0"/>
-                <a:ea typeface="宋体" panose="02010600030101010101" pitchFamily="2" charset="-122"/>
+                <a:latin typeface="等线" panose="02010600030101010101" pitchFamily="2" charset="-122"/>
+                <a:ea typeface="等线" panose="02010600030101010101" pitchFamily="2" charset="-122"/>
+                <a:cs typeface="Courier New" panose="02070309020205020404" pitchFamily="49" charset="0"/>
               </a:rPr>
               <a:t>Server Push</a:t>
             </a:r>
@@ -14943,8 +15198,9 @@
                 <a:solidFill>
                   <a:schemeClr val="bg1"/>
                 </a:solidFill>
-                <a:latin typeface="Consolas" panose="020B0609020204030204" pitchFamily="49" charset="0"/>
-                <a:ea typeface="宋体" panose="02010600030101010101" pitchFamily="2" charset="-122"/>
+                <a:latin typeface="等线" panose="02010600030101010101" pitchFamily="2" charset="-122"/>
+                <a:ea typeface="等线" panose="02010600030101010101" pitchFamily="2" charset="-122"/>
+                <a:cs typeface="Courier New" panose="02070309020205020404" pitchFamily="49" charset="0"/>
               </a:rPr>
               <a:t>Perf</a:t>
             </a:r>
@@ -15008,8 +15264,9 @@
                 <a:solidFill>
                   <a:schemeClr val="bg1"/>
                 </a:solidFill>
-                <a:latin typeface="Consolas" panose="020B0609020204030204" pitchFamily="49" charset="0"/>
-                <a:ea typeface="宋体" panose="02010600030101010101" pitchFamily="2" charset="-122"/>
+                <a:latin typeface="等线" panose="02010600030101010101" pitchFamily="2" charset="-122"/>
+                <a:ea typeface="等线" panose="02010600030101010101" pitchFamily="2" charset="-122"/>
+                <a:cs typeface="Courier New" panose="02070309020205020404" pitchFamily="49" charset="0"/>
               </a:rPr>
               <a:t>YSlow</a:t>
             </a:r>
@@ -15073,8 +15330,9 @@
                 <a:solidFill>
                   <a:schemeClr val="bg1"/>
                 </a:solidFill>
-                <a:latin typeface="Consolas" panose="020B0609020204030204" pitchFamily="49" charset="0"/>
-                <a:ea typeface="宋体" panose="02010600030101010101" pitchFamily="2" charset="-122"/>
+                <a:latin typeface="等线" panose="02010600030101010101" pitchFamily="2" charset="-122"/>
+                <a:ea typeface="等线" panose="02010600030101010101" pitchFamily="2" charset="-122"/>
+                <a:cs typeface="Courier New" panose="02070309020205020404" pitchFamily="49" charset="0"/>
               </a:rPr>
               <a:t>jsPerf</a:t>
             </a:r>
@@ -15138,8 +15396,9 @@
                 <a:solidFill>
                   <a:schemeClr val="bg1"/>
                 </a:solidFill>
-                <a:latin typeface="Consolas" panose="020B0609020204030204" pitchFamily="49" charset="0"/>
-                <a:ea typeface="宋体" panose="02010600030101010101" pitchFamily="2" charset="-122"/>
+                <a:latin typeface="等线" panose="02010600030101010101" pitchFamily="2" charset="-122"/>
+                <a:ea typeface="等线" panose="02010600030101010101" pitchFamily="2" charset="-122"/>
+                <a:cs typeface="Courier New" panose="02070309020205020404" pitchFamily="49" charset="0"/>
               </a:rPr>
               <a:t>Speed Tracer</a:t>
             </a:r>
@@ -15203,8 +15462,9 @@
                 <a:solidFill>
                   <a:schemeClr val="bg1"/>
                 </a:solidFill>
-                <a:latin typeface="Consolas" panose="020B0609020204030204" pitchFamily="49" charset="0"/>
-                <a:ea typeface="宋体" panose="02010600030101010101" pitchFamily="2" charset="-122"/>
+                <a:latin typeface="等线" panose="02010600030101010101" pitchFamily="2" charset="-122"/>
+                <a:ea typeface="等线" panose="02010600030101010101" pitchFamily="2" charset="-122"/>
+                <a:cs typeface="Courier New" panose="02070309020205020404" pitchFamily="49" charset="0"/>
               </a:rPr>
               <a:t>Dynatrace</a:t>
             </a:r>
@@ -15268,8 +15528,9 @@
                 <a:solidFill>
                   <a:schemeClr val="bg1"/>
                 </a:solidFill>
-                <a:latin typeface="Consolas" panose="020B0609020204030204" pitchFamily="49" charset="0"/>
-                <a:ea typeface="宋体" panose="02010600030101010101" pitchFamily="2" charset="-122"/>
+                <a:latin typeface="等线" panose="02010600030101010101" pitchFamily="2" charset="-122"/>
+                <a:ea typeface="等线" panose="02010600030101010101" pitchFamily="2" charset="-122"/>
+                <a:cs typeface="Courier New" panose="02070309020205020404" pitchFamily="49" charset="0"/>
               </a:rPr>
               <a:t>PageSpeed</a:t>
             </a:r>
@@ -15333,8 +15594,9 @@
                 <a:solidFill>
                   <a:schemeClr val="bg1"/>
                 </a:solidFill>
-                <a:latin typeface="Consolas" panose="020B0609020204030204" pitchFamily="49" charset="0"/>
-                <a:ea typeface="宋体" panose="02010600030101010101" pitchFamily="2" charset="-122"/>
+                <a:latin typeface="等线" panose="02010600030101010101" pitchFamily="2" charset="-122"/>
+                <a:ea typeface="等线" panose="02010600030101010101" pitchFamily="2" charset="-122"/>
+                <a:cs typeface="Courier New" panose="02070309020205020404" pitchFamily="49" charset="0"/>
               </a:rPr>
               <a:t>Visual Studio</a:t>
             </a:r>
@@ -15404,8 +15666,9 @@
                 <a:solidFill>
                   <a:schemeClr val="bg1"/>
                 </a:solidFill>
-                <a:latin typeface="Consolas" panose="020B0609020204030204" pitchFamily="49" charset="0"/>
-                <a:ea typeface="宋体" panose="02010600030101010101" pitchFamily="2" charset="-122"/>
+                <a:latin typeface="等线" panose="02010600030101010101" pitchFamily="2" charset="-122"/>
+                <a:ea typeface="等线" panose="02010600030101010101" pitchFamily="2" charset="-122"/>
+                <a:cs typeface="Courier New" panose="02070309020205020404" pitchFamily="49" charset="0"/>
               </a:rPr>
               <a:t>Standards</a:t>
             </a:r>
@@ -15469,8 +15732,9 @@
                 <a:solidFill>
                   <a:schemeClr val="bg1"/>
                 </a:solidFill>
-                <a:latin typeface="Consolas" panose="020B0609020204030204" pitchFamily="49" charset="0"/>
-                <a:ea typeface="宋体" panose="02010600030101010101" pitchFamily="2" charset="-122"/>
+                <a:latin typeface="等线" panose="02010600030101010101" pitchFamily="2" charset="-122"/>
+                <a:ea typeface="等线" panose="02010600030101010101" pitchFamily="2" charset="-122"/>
+                <a:cs typeface="Courier New" panose="02070309020205020404" pitchFamily="49" charset="0"/>
               </a:rPr>
               <a:t>W3C</a:t>
             </a:r>
@@ -15482,8 +15746,9 @@
                 <a:solidFill>
                   <a:schemeClr val="bg1"/>
                 </a:solidFill>
-                <a:latin typeface="Consolas" panose="020B0609020204030204" pitchFamily="49" charset="0"/>
-                <a:ea typeface="宋体" panose="02010600030101010101" pitchFamily="2" charset="-122"/>
+                <a:latin typeface="等线" panose="02010600030101010101" pitchFamily="2" charset="-122"/>
+                <a:ea typeface="等线" panose="02010600030101010101" pitchFamily="2" charset="-122"/>
+                <a:cs typeface="Courier New" panose="02070309020205020404" pitchFamily="49" charset="0"/>
               </a:rPr>
               <a:t>(HTML, CSS</a:t>
             </a:r>
@@ -15492,8 +15757,9 @@
                 <a:solidFill>
                   <a:schemeClr val="bg1"/>
                 </a:solidFill>
-                <a:latin typeface="Consolas" panose="020B0609020204030204" pitchFamily="49" charset="0"/>
-                <a:ea typeface="宋体" panose="02010600030101010101" pitchFamily="2" charset="-122"/>
+                <a:latin typeface="等线" panose="02010600030101010101" pitchFamily="2" charset="-122"/>
+                <a:ea typeface="等线" panose="02010600030101010101" pitchFamily="2" charset="-122"/>
+                <a:cs typeface="Courier New" panose="02070309020205020404" pitchFamily="49" charset="0"/>
               </a:rPr>
               <a:t>, </a:t>
             </a:r>
@@ -15502,8 +15768,9 @@
                 <a:solidFill>
                   <a:schemeClr val="bg1"/>
                 </a:solidFill>
-                <a:latin typeface="Consolas" panose="020B0609020204030204" pitchFamily="49" charset="0"/>
-                <a:ea typeface="宋体" panose="02010600030101010101" pitchFamily="2" charset="-122"/>
+                <a:latin typeface="等线" panose="02010600030101010101" pitchFamily="2" charset="-122"/>
+                <a:ea typeface="等线" panose="02010600030101010101" pitchFamily="2" charset="-122"/>
+                <a:cs typeface="Courier New" panose="02070309020205020404" pitchFamily="49" charset="0"/>
               </a:rPr>
               <a:t>XHTML, XML, JSON...)</a:t>
             </a:r>
@@ -15567,8 +15834,9 @@
                 <a:solidFill>
                   <a:schemeClr val="bg1"/>
                 </a:solidFill>
-                <a:latin typeface="Consolas" panose="020B0609020204030204" pitchFamily="49" charset="0"/>
-                <a:ea typeface="宋体" panose="02010600030101010101" pitchFamily="2" charset="-122"/>
+                <a:latin typeface="等线" panose="02010600030101010101" pitchFamily="2" charset="-122"/>
+                <a:ea typeface="等线" panose="02010600030101010101" pitchFamily="2" charset="-122"/>
+                <a:cs typeface="Courier New" panose="02070309020205020404" pitchFamily="49" charset="0"/>
               </a:rPr>
               <a:t>ECMAScript</a:t>
             </a:r>
@@ -15580,12 +15848,17 @@
                 <a:solidFill>
                   <a:schemeClr val="bg1"/>
                 </a:solidFill>
-                <a:latin typeface="Consolas" panose="020B0609020204030204" pitchFamily="49" charset="0"/>
-                <a:ea typeface="宋体" panose="02010600030101010101" pitchFamily="2" charset="-122"/>
+                <a:latin typeface="等线" panose="02010600030101010101" pitchFamily="2" charset="-122"/>
+                <a:ea typeface="等线" panose="02010600030101010101" pitchFamily="2" charset="-122"/>
+                <a:cs typeface="Courier New" panose="02070309020205020404" pitchFamily="49" charset="0"/>
               </a:rPr>
               <a:t>(JavaScript)</a:t>
             </a:r>
-            <a:endParaRPr lang="en-AU" altLang="en-US" sz="800"/>
+            <a:endParaRPr lang="en-AU" altLang="en-US" sz="800">
+              <a:latin typeface="等线" panose="02010600030101010101" pitchFamily="2" charset="-122"/>
+              <a:ea typeface="等线" panose="02010600030101010101" pitchFamily="2" charset="-122"/>
+              <a:cs typeface="Courier New" panose="02070309020205020404" pitchFamily="49" charset="0"/>
+            </a:endParaRPr>
           </a:p>
         </p:txBody>
       </p:sp>
@@ -15646,8 +15919,9 @@
                 <a:solidFill>
                   <a:schemeClr val="bg1"/>
                 </a:solidFill>
-                <a:latin typeface="Consolas" panose="020B0609020204030204" pitchFamily="49" charset="0"/>
-                <a:ea typeface="宋体" panose="02010600030101010101" pitchFamily="2" charset="-122"/>
+                <a:latin typeface="等线" panose="02010600030101010101" pitchFamily="2" charset="-122"/>
+                <a:ea typeface="等线" panose="02010600030101010101" pitchFamily="2" charset="-122"/>
+                <a:cs typeface="Courier New" panose="02070309020205020404" pitchFamily="49" charset="0"/>
               </a:rPr>
               <a:t>HTML5/CSS3</a:t>
             </a:r>
@@ -15711,8 +15985,9 @@
                 <a:solidFill>
                   <a:schemeClr val="bg1"/>
                 </a:solidFill>
-                <a:latin typeface="Consolas" panose="020B0609020204030204" pitchFamily="49" charset="0"/>
-                <a:ea typeface="宋体" panose="02010600030101010101" pitchFamily="2" charset="-122"/>
+                <a:latin typeface="等线" panose="02010600030101010101" pitchFamily="2" charset="-122"/>
+                <a:ea typeface="等线" panose="02010600030101010101" pitchFamily="2" charset="-122"/>
+                <a:cs typeface="Courier New" panose="02070309020205020404" pitchFamily="49" charset="0"/>
               </a:rPr>
               <a:t>Foundation</a:t>
             </a:r>
@@ -15776,8 +16051,9 @@
                 <a:solidFill>
                   <a:schemeClr val="bg1"/>
                 </a:solidFill>
-                <a:latin typeface="Consolas" panose="020B0609020204030204" pitchFamily="49" charset="0"/>
-                <a:ea typeface="宋体" panose="02010600030101010101" pitchFamily="2" charset="-122"/>
+                <a:latin typeface="等线" panose="02010600030101010101" pitchFamily="2" charset="-122"/>
+                <a:ea typeface="等线" panose="02010600030101010101" pitchFamily="2" charset="-122"/>
+                <a:cs typeface="Courier New" panose="02070309020205020404" pitchFamily="49" charset="0"/>
               </a:rPr>
               <a:t>Emacs</a:t>
             </a:r>
@@ -15847,7 +16123,9 @@
                 <a:solidFill>
                   <a:schemeClr val="bg1"/>
                 </a:solidFill>
-                <a:latin typeface="Consolas" panose="020B0609020204030204" pitchFamily="49" charset="0"/>
+                <a:latin typeface="等线" panose="02010600030101010101" pitchFamily="2" charset="-122"/>
+                <a:ea typeface="等线" panose="02010600030101010101" pitchFamily="2" charset="-122"/>
+                <a:cs typeface="Courier New" panose="02070309020205020404" pitchFamily="49" charset="0"/>
               </a:rPr>
               <a:t>Runtime</a:t>
             </a:r>
@@ -15911,8 +16189,9 @@
                 <a:solidFill>
                   <a:schemeClr val="bg1"/>
                 </a:solidFill>
-                <a:latin typeface="Consolas" panose="020B0609020204030204" pitchFamily="49" charset="0"/>
-                <a:ea typeface="宋体" panose="02010600030101010101" pitchFamily="2" charset="-122"/>
+                <a:latin typeface="等线" panose="02010600030101010101" pitchFamily="2" charset="-122"/>
+                <a:ea typeface="等线" panose="02010600030101010101" pitchFamily="2" charset="-122"/>
+                <a:cs typeface="Courier New" panose="02070309020205020404" pitchFamily="49" charset="0"/>
               </a:rPr>
               <a:t>Cookie</a:t>
             </a:r>
@@ -15976,8 +16255,9 @@
                 <a:solidFill>
                   <a:schemeClr val="bg1"/>
                 </a:solidFill>
-                <a:latin typeface="Consolas" panose="020B0609020204030204" pitchFamily="49" charset="0"/>
-                <a:ea typeface="宋体" panose="02010600030101010101" pitchFamily="2" charset="-122"/>
+                <a:latin typeface="等线" panose="02010600030101010101" pitchFamily="2" charset="-122"/>
+                <a:ea typeface="等线" panose="02010600030101010101" pitchFamily="2" charset="-122"/>
+                <a:cs typeface="Courier New" panose="02070309020205020404" pitchFamily="49" charset="0"/>
               </a:rPr>
               <a:t>Local Cache</a:t>
             </a:r>
@@ -16041,8 +16321,9 @@
                 <a:solidFill>
                   <a:schemeClr val="bg1"/>
                 </a:solidFill>
-                <a:latin typeface="Consolas" panose="020B0609020204030204" pitchFamily="49" charset="0"/>
-                <a:ea typeface="宋体" panose="02010600030101010101" pitchFamily="2" charset="-122"/>
+                <a:latin typeface="等线" panose="02010600030101010101" pitchFamily="2" charset="-122"/>
+                <a:ea typeface="等线" panose="02010600030101010101" pitchFamily="2" charset="-122"/>
+                <a:cs typeface="Courier New" panose="02070309020205020404" pitchFamily="49" charset="0"/>
               </a:rPr>
               <a:t>Session</a:t>
             </a:r>
@@ -16051,8 +16332,9 @@
                 <a:solidFill>
                   <a:schemeClr val="bg1"/>
                 </a:solidFill>
-                <a:latin typeface="Consolas" panose="020B0609020204030204" pitchFamily="49" charset="0"/>
-                <a:ea typeface="宋体" panose="02010600030101010101" pitchFamily="2" charset="-122"/>
+                <a:latin typeface="等线" panose="02010600030101010101" pitchFamily="2" charset="-122"/>
+                <a:ea typeface="等线" panose="02010600030101010101" pitchFamily="2" charset="-122"/>
+                <a:cs typeface="Courier New" panose="02070309020205020404" pitchFamily="49" charset="0"/>
               </a:rPr>
               <a:t> </a:t>
             </a:r>
@@ -16061,8 +16343,9 @@
                 <a:solidFill>
                   <a:schemeClr val="bg1"/>
                 </a:solidFill>
-                <a:latin typeface="Consolas" panose="020B0609020204030204" pitchFamily="49" charset="0"/>
-                <a:ea typeface="宋体" panose="02010600030101010101" pitchFamily="2" charset="-122"/>
+                <a:latin typeface="等线" panose="02010600030101010101" pitchFamily="2" charset="-122"/>
+                <a:ea typeface="等线" panose="02010600030101010101" pitchFamily="2" charset="-122"/>
+                <a:cs typeface="Courier New" panose="02070309020205020404" pitchFamily="49" charset="0"/>
               </a:rPr>
               <a:t>Storage</a:t>
             </a:r>
@@ -16126,8 +16409,9 @@
                 <a:solidFill>
                   <a:schemeClr val="bg1"/>
                 </a:solidFill>
-                <a:latin typeface="Consolas" panose="020B0609020204030204" pitchFamily="49" charset="0"/>
-                <a:ea typeface="宋体" panose="02010600030101010101" pitchFamily="2" charset="-122"/>
+                <a:latin typeface="等线" panose="02010600030101010101" pitchFamily="2" charset="-122"/>
+                <a:ea typeface="等线" panose="02010600030101010101" pitchFamily="2" charset="-122"/>
+                <a:cs typeface="Courier New" panose="02070309020205020404" pitchFamily="49" charset="0"/>
               </a:rPr>
               <a:t>Local Storage</a:t>
             </a:r>
@@ -16191,8 +16475,9 @@
                 <a:solidFill>
                   <a:schemeClr val="bg1"/>
                 </a:solidFill>
-                <a:latin typeface="Consolas" panose="020B0609020204030204" pitchFamily="49" charset="0"/>
-                <a:ea typeface="宋体" panose="02010600030101010101" pitchFamily="2" charset="-122"/>
+                <a:latin typeface="等线" panose="02010600030101010101" pitchFamily="2" charset="-122"/>
+                <a:ea typeface="等线" panose="02010600030101010101" pitchFamily="2" charset="-122"/>
+                <a:cs typeface="Courier New" panose="02070309020205020404" pitchFamily="49" charset="0"/>
               </a:rPr>
               <a:t>Resources </a:t>
             </a:r>
@@ -16204,8 +16489,9 @@
                 <a:solidFill>
                   <a:schemeClr val="bg1"/>
                 </a:solidFill>
-                <a:latin typeface="Consolas" panose="020B0609020204030204" pitchFamily="49" charset="0"/>
-                <a:ea typeface="宋体" panose="02010600030101010101" pitchFamily="2" charset="-122"/>
+                <a:latin typeface="等线" panose="02010600030101010101" pitchFamily="2" charset="-122"/>
+                <a:ea typeface="等线" panose="02010600030101010101" pitchFamily="2" charset="-122"/>
+                <a:cs typeface="Courier New" panose="02070309020205020404" pitchFamily="49" charset="0"/>
               </a:rPr>
               <a:t>(img, icon, font, video)</a:t>
             </a:r>
@@ -16269,8 +16555,9 @@
                 <a:solidFill>
                   <a:schemeClr val="bg1"/>
                 </a:solidFill>
-                <a:latin typeface="Consolas" panose="020B0609020204030204" pitchFamily="49" charset="0"/>
-                <a:ea typeface="宋体" panose="02010600030101010101" pitchFamily="2" charset="-122"/>
+                <a:latin typeface="等线" panose="02010600030101010101" pitchFamily="2" charset="-122"/>
+                <a:ea typeface="等线" panose="02010600030101010101" pitchFamily="2" charset="-122"/>
+                <a:cs typeface="Courier New" panose="02070309020205020404" pitchFamily="49" charset="0"/>
               </a:rPr>
               <a:t>Components</a:t>
             </a:r>
@@ -16282,8 +16569,9 @@
                 <a:solidFill>
                   <a:schemeClr val="bg1"/>
                 </a:solidFill>
-                <a:latin typeface="Consolas" panose="020B0609020204030204" pitchFamily="49" charset="0"/>
-                <a:ea typeface="宋体" panose="02010600030101010101" pitchFamily="2" charset="-122"/>
+                <a:latin typeface="等线" panose="02010600030101010101" pitchFamily="2" charset="-122"/>
+                <a:ea typeface="等线" panose="02010600030101010101" pitchFamily="2" charset="-122"/>
+                <a:cs typeface="Courier New" panose="02070309020205020404" pitchFamily="49" charset="0"/>
               </a:rPr>
               <a:t>(extension, plugin)</a:t>
             </a:r>
@@ -16347,8 +16635,9 @@
                 <a:solidFill>
                   <a:schemeClr val="bg1"/>
                 </a:solidFill>
-                <a:latin typeface="Consolas" panose="020B0609020204030204" pitchFamily="49" charset="0"/>
-                <a:ea typeface="宋体" panose="02010600030101010101" pitchFamily="2" charset="-122"/>
+                <a:latin typeface="等线" panose="02010600030101010101" pitchFamily="2" charset="-122"/>
+                <a:ea typeface="等线" panose="02010600030101010101" pitchFamily="2" charset="-122"/>
+                <a:cs typeface="Courier New" panose="02070309020205020404" pitchFamily="49" charset="0"/>
               </a:rPr>
               <a:t>CORS</a:t>
             </a:r>
@@ -16412,8 +16701,9 @@
                 <a:solidFill>
                   <a:schemeClr val="bg1"/>
                 </a:solidFill>
-                <a:latin typeface="Consolas" panose="020B0609020204030204" pitchFamily="49" charset="0"/>
-                <a:ea typeface="宋体" panose="02010600030101010101" pitchFamily="2" charset="-122"/>
+                <a:latin typeface="等线" panose="02010600030101010101" pitchFamily="2" charset="-122"/>
+                <a:ea typeface="等线" panose="02010600030101010101" pitchFamily="2" charset="-122"/>
+                <a:cs typeface="Courier New" panose="02070309020205020404" pitchFamily="49" charset="0"/>
               </a:rPr>
               <a:t>SSL</a:t>
             </a:r>
@@ -16477,8 +16767,9 @@
                 <a:solidFill>
                   <a:schemeClr val="bg1"/>
                 </a:solidFill>
-                <a:latin typeface="Consolas" panose="020B0609020204030204" pitchFamily="49" charset="0"/>
-                <a:ea typeface="宋体" panose="02010600030101010101" pitchFamily="2" charset="-122"/>
+                <a:latin typeface="等线" panose="02010600030101010101" pitchFamily="2" charset="-122"/>
+                <a:ea typeface="等线" panose="02010600030101010101" pitchFamily="2" charset="-122"/>
+                <a:cs typeface="Courier New" panose="02070309020205020404" pitchFamily="49" charset="0"/>
               </a:rPr>
               <a:t>OAuth</a:t>
             </a:r>
@@ -16542,8 +16833,9 @@
                 <a:solidFill>
                   <a:schemeClr val="bg1"/>
                 </a:solidFill>
-                <a:latin typeface="Consolas" panose="020B0609020204030204" pitchFamily="49" charset="0"/>
-                <a:ea typeface="宋体" panose="02010600030101010101" pitchFamily="2" charset="-122"/>
+                <a:latin typeface="等线" panose="02010600030101010101" pitchFamily="2" charset="-122"/>
+                <a:ea typeface="等线" panose="02010600030101010101" pitchFamily="2" charset="-122"/>
+                <a:cs typeface="Courier New" panose="02070309020205020404" pitchFamily="49" charset="0"/>
               </a:rPr>
               <a:t>CDN </a:t>
             </a:r>
@@ -16555,6 +16847,13 @@
   <p:clrMapOvr>
     <a:masterClrMapping/>
   </p:clrMapOvr>
+  <p:timing>
+    <p:tnLst>
+      <p:par>
+        <p:cTn id="1" dur="indefinite" restart="never" nodeType="tmRoot"/>
+      </p:par>
+    </p:tnLst>
+  </p:timing>
 </p:sld>
 </file>
 

</xml_diff>